<commit_message>
Précisions sur le fonctionnement bootstrap
</commit_message>
<xml_diff>
--- a/doc/setup/Cluster-Consul-v1.0.pptx
+++ b/doc/setup/Cluster-Consul-v1.0.pptx
@@ -5,19 +5,20 @@
     <p:sldMasterId id="2147483648" r:id="rId4"/>
   </p:sldMasterIdLst>
   <p:notesMasterIdLst>
-    <p:notesMasterId r:id="rId12"/>
+    <p:notesMasterId r:id="rId13"/>
   </p:notesMasterIdLst>
   <p:handoutMasterIdLst>
-    <p:handoutMasterId r:id="rId13"/>
+    <p:handoutMasterId r:id="rId14"/>
   </p:handoutMasterIdLst>
   <p:sldIdLst>
     <p:sldId id="639" r:id="rId5"/>
     <p:sldId id="670" r:id="rId6"/>
     <p:sldId id="665" r:id="rId7"/>
     <p:sldId id="671" r:id="rId8"/>
-    <p:sldId id="673" r:id="rId9"/>
-    <p:sldId id="672" r:id="rId10"/>
+    <p:sldId id="675" r:id="rId9"/>
+    <p:sldId id="673" r:id="rId10"/>
     <p:sldId id="674" r:id="rId11"/>
+    <p:sldId id="672" r:id="rId12"/>
   </p:sldIdLst>
   <p:sldSz cx="9144000" cy="6858000" type="screen4x3"/>
   <p:notesSz cx="6797675" cy="9926638"/>
@@ -3063,7 +3064,7 @@
                 </a:solidFill>
                 <a:latin typeface="Trebuchet MS" pitchFamily="34" charset="0"/>
               </a:rPr>
-              <a:t>Consul agent</a:t>
+              <a:t>Agent Consul</a:t>
             </a:r>
             <a:endParaRPr lang="fr-FR" sz="4000" b="1" dirty="0">
               <a:solidFill>
@@ -3190,7 +3191,16 @@
                 </a:solidFill>
                 <a:latin typeface="+mn-lt"/>
               </a:rPr>
-              <a:t>Consul agent</a:t>
+              <a:t>Agent </a:t>
+            </a:r>
+            <a:r>
+              <a:rPr lang="fr-FR" sz="2800" dirty="0" smtClean="0">
+                <a:solidFill>
+                  <a:schemeClr val="accent4"/>
+                </a:solidFill>
+                <a:latin typeface="+mn-lt"/>
+              </a:rPr>
+              <a:t>Consul</a:t>
             </a:r>
             <a:endParaRPr lang="fr-FR" sz="2800" dirty="0">
               <a:solidFill>
@@ -3206,7 +3216,7 @@
           <p:cNvPr id="20" name="ZoneTexte 19">
             <a:extLst>
               <a:ext uri="{FF2B5EF4-FFF2-40B4-BE49-F238E27FC236}">
-                <a16:creationId xmlns:a16="http://schemas.microsoft.com/office/drawing/2014/main" xmlns="" id="{02012D19-F34D-4179-AA25-13C4AC886B01}"/>
+                <a16:creationId xmlns="" xmlns:a16="http://schemas.microsoft.com/office/drawing/2014/main" id="{02012D19-F34D-4179-AA25-13C4AC886B01}"/>
               </a:ext>
             </a:extLst>
           </p:cNvPr>
@@ -3216,7 +3226,7 @@
         <p:spPr>
           <a:xfrm>
             <a:off x="241581" y="872716"/>
-            <a:ext cx="8821515" cy="3785652"/>
+            <a:ext cx="8821515" cy="5016758"/>
           </a:xfrm>
           <a:prstGeom prst="rect">
             <a:avLst/>
@@ -3231,8 +3241,50 @@
           <a:p>
             <a:r>
               <a:rPr lang="fr-FR" sz="2000" dirty="0" smtClean="0"/>
-              <a:t>Pour mettre en place un agent il faut, au minimum, les 5 options suivantes :</a:t>
-            </a:r>
+              <a:t>Un agent Consul peut être soit un serveur, soit un client.</a:t>
+            </a:r>
+          </a:p>
+          <a:p>
+            <a:endParaRPr lang="fr-FR" sz="2000" dirty="0"/>
+          </a:p>
+          <a:p>
+            <a:r>
+              <a:rPr lang="fr-FR" sz="2000" dirty="0" smtClean="0"/>
+              <a:t>Pour </a:t>
+            </a:r>
+            <a:r>
+              <a:rPr lang="fr-FR" sz="2000" dirty="0" smtClean="0"/>
+              <a:t>mettre en place un </a:t>
+            </a:r>
+            <a:r>
+              <a:rPr lang="fr-FR" sz="2000" dirty="0" smtClean="0"/>
+              <a:t>agent, </a:t>
+            </a:r>
+            <a:r>
+              <a:rPr lang="fr-FR" sz="2000" dirty="0" smtClean="0"/>
+              <a:t>il </a:t>
+            </a:r>
+            <a:r>
+              <a:rPr lang="fr-FR" sz="2000" dirty="0" smtClean="0"/>
+              <a:t>faut </a:t>
+            </a:r>
+            <a:r>
+              <a:rPr lang="fr-FR" sz="2000" dirty="0" smtClean="0"/>
+              <a:t>au </a:t>
+            </a:r>
+            <a:r>
+              <a:rPr lang="fr-FR" sz="2000" dirty="0" smtClean="0"/>
+              <a:t>minimum </a:t>
+            </a:r>
+            <a:r>
+              <a:rPr lang="fr-FR" sz="2000" dirty="0" smtClean="0"/>
+              <a:t>les 5 options suivantes </a:t>
+            </a:r>
+            <a:r>
+              <a:rPr lang="fr-FR" sz="2000" dirty="0" smtClean="0"/>
+              <a:t>dans le fichier de configuration :</a:t>
+            </a:r>
+            <a:endParaRPr lang="fr-FR" sz="2000" dirty="0" smtClean="0"/>
           </a:p>
           <a:p>
             <a:endParaRPr lang="fr-FR" sz="2000" dirty="0"/>
@@ -3282,7 +3334,15 @@
             </a:r>
             <a:r>
               <a:rPr lang="fr-FR" sz="2000" dirty="0" smtClean="0"/>
-              <a:t> » : Liste des adresses des autres serveurs du cluster.</a:t>
+              <a:t> » : Liste des adresses </a:t>
+            </a:r>
+            <a:r>
+              <a:rPr lang="fr-FR" sz="2000" dirty="0" smtClean="0"/>
+              <a:t>IP des </a:t>
+            </a:r>
+            <a:r>
+              <a:rPr lang="fr-FR" sz="2000" dirty="0" smtClean="0"/>
+              <a:t>autres serveurs du cluster.</a:t>
             </a:r>
           </a:p>
           <a:p>
@@ -3299,7 +3359,15 @@
             </a:r>
             <a:r>
               <a:rPr lang="fr-FR" sz="2000" dirty="0" smtClean="0"/>
-              <a:t> » : Adresse de la machine sur le réseau</a:t>
+              <a:t> » : </a:t>
+            </a:r>
+            <a:r>
+              <a:rPr lang="fr-FR" sz="2000" dirty="0" smtClean="0"/>
+              <a:t>Adresse IP </a:t>
+            </a:r>
+            <a:r>
+              <a:rPr lang="fr-FR" sz="2000" dirty="0" smtClean="0"/>
+              <a:t>de la machine sur le réseau</a:t>
             </a:r>
           </a:p>
           <a:p>
@@ -3316,7 +3384,29 @@
             </a:r>
             <a:r>
               <a:rPr lang="fr-FR" sz="2000" dirty="0" smtClean="0"/>
-              <a:t> » : La clé secrète de chiffrement pour le trafic réseau de Consul</a:t>
+              <a:t> » : La clé secrète de chiffrement pour le trafic réseau de </a:t>
+            </a:r>
+            <a:r>
+              <a:rPr lang="fr-FR" sz="2000" dirty="0" smtClean="0"/>
+              <a:t>Consul</a:t>
+            </a:r>
+          </a:p>
+          <a:p>
+            <a:r>
+              <a:rPr lang="fr-FR" sz="2000" dirty="0"/>
+              <a:t>	</a:t>
+            </a:r>
+            <a:r>
+              <a:rPr lang="fr-FR" sz="2000" dirty="0" smtClean="0"/>
+              <a:t>La clé peut être générée avec la commande « consul </a:t>
+            </a:r>
+            <a:r>
+              <a:rPr lang="fr-FR" sz="2000" dirty="0" err="1" smtClean="0"/>
+              <a:t>keygen</a:t>
+            </a:r>
+            <a:r>
+              <a:rPr lang="fr-FR" sz="2000" dirty="0" smtClean="0"/>
+              <a:t> »</a:t>
             </a:r>
             <a:endParaRPr lang="fr-FR" sz="2000" dirty="0"/>
           </a:p>
@@ -3399,7 +3489,7 @@
                 </a:solidFill>
                 <a:latin typeface="+mn-lt"/>
               </a:rPr>
-              <a:t>Consul agent</a:t>
+              <a:t>Agent Consul</a:t>
             </a:r>
             <a:endParaRPr lang="fr-FR" sz="2800" dirty="0">
               <a:solidFill>
@@ -3415,7 +3505,7 @@
           <p:cNvPr id="20" name="ZoneTexte 19">
             <a:extLst>
               <a:ext uri="{FF2B5EF4-FFF2-40B4-BE49-F238E27FC236}">
-                <a16:creationId xmlns:a16="http://schemas.microsoft.com/office/drawing/2014/main" xmlns="" id="{02012D19-F34D-4179-AA25-13C4AC886B01}"/>
+                <a16:creationId xmlns="" xmlns:a16="http://schemas.microsoft.com/office/drawing/2014/main" id="{02012D19-F34D-4179-AA25-13C4AC886B01}"/>
               </a:ext>
             </a:extLst>
           </p:cNvPr>
@@ -3425,7 +3515,7 @@
         <p:spPr>
           <a:xfrm>
             <a:off x="241581" y="872716"/>
-            <a:ext cx="8821515" cy="1323439"/>
+            <a:ext cx="8821515" cy="2862322"/>
           </a:xfrm>
           <a:prstGeom prst="rect">
             <a:avLst/>
@@ -3466,7 +3556,69 @@
             </a:r>
             <a:r>
               <a:rPr lang="fr-FR" sz="2000" dirty="0" smtClean="0"/>
-              <a:t> » Permet au premier serveur lancé de s’auto élire en tant que leader. Laisser à false pour le lancement de serveurs standards.</a:t>
+              <a:t> » </a:t>
+            </a:r>
+            <a:r>
+              <a:rPr lang="fr-FR" sz="2000" dirty="0" smtClean="0"/>
+              <a:t>Lance un serveur avec le droit de prendre des décisions sans se concerter avec les autres serveurs du cluster. Cela lui permet entre autre de se lancer en leader.</a:t>
+            </a:r>
+          </a:p>
+          <a:p>
+            <a:r>
+              <a:rPr lang="fr-FR" sz="2000" dirty="0" smtClean="0"/>
+              <a:t>Les options « </a:t>
+            </a:r>
+            <a:r>
+              <a:rPr lang="fr-FR" sz="2000" b="1" dirty="0" err="1" smtClean="0"/>
+              <a:t>start_join</a:t>
+            </a:r>
+            <a:r>
+              <a:rPr lang="fr-FR" sz="2000" dirty="0" smtClean="0"/>
+              <a:t> » et « </a:t>
+            </a:r>
+            <a:r>
+              <a:rPr lang="fr-FR" sz="2000" b="1" dirty="0" err="1" smtClean="0"/>
+              <a:t>bind_addr</a:t>
+            </a:r>
+            <a:r>
+              <a:rPr lang="fr-FR" sz="2000" dirty="0" smtClean="0"/>
+              <a:t> » ne sont pa</a:t>
+            </a:r>
+            <a:r>
+              <a:rPr lang="fr-FR" sz="2000" dirty="0" smtClean="0"/>
+              <a:t>s à mettre dans le fichier de configuration dans le cas du serveur </a:t>
+            </a:r>
+            <a:r>
+              <a:rPr lang="fr-FR" sz="2000" dirty="0" err="1" smtClean="0"/>
+              <a:t>bootstrap</a:t>
+            </a:r>
+            <a:r>
+              <a:rPr lang="fr-FR" sz="2000" dirty="0" smtClean="0"/>
+              <a:t>.</a:t>
+            </a:r>
+          </a:p>
+          <a:p>
+            <a:endParaRPr lang="fr-FR" sz="2000" dirty="0" smtClean="0"/>
+          </a:p>
+          <a:p>
+            <a:r>
+              <a:rPr lang="fr-FR" sz="2000" dirty="0" smtClean="0"/>
+              <a:t>Laisser </a:t>
+            </a:r>
+            <a:r>
+              <a:rPr lang="fr-FR" sz="2000" dirty="0" smtClean="0"/>
+              <a:t>à </a:t>
+            </a:r>
+            <a:r>
+              <a:rPr lang="fr-FR" sz="2000" dirty="0" smtClean="0">
+                <a:latin typeface="Courier New" panose="02070309020205020404" pitchFamily="49" charset="0"/>
+                <a:cs typeface="Courier New" panose="02070309020205020404" pitchFamily="49" charset="0"/>
+              </a:rPr>
+              <a:t>false</a:t>
+            </a:r>
+            <a:r>
+              <a:rPr lang="fr-FR" sz="2000" dirty="0" smtClean="0"/>
+              <a:t> pour le lancement de serveurs standards.</a:t>
             </a:r>
           </a:p>
         </p:txBody>
@@ -3476,7 +3628,7 @@
           <p:cNvPr id="6" name="ZoneTexte 5">
             <a:extLst>
               <a:ext uri="{FF2B5EF4-FFF2-40B4-BE49-F238E27FC236}">
-                <a16:creationId xmlns:a16="http://schemas.microsoft.com/office/drawing/2014/main" xmlns="" id="{02012D19-F34D-4179-AA25-13C4AC886B01}"/>
+                <a16:creationId xmlns="" xmlns:a16="http://schemas.microsoft.com/office/drawing/2014/main" id="{02012D19-F34D-4179-AA25-13C4AC886B01}"/>
               </a:ext>
             </a:extLst>
           </p:cNvPr>
@@ -3485,8 +3637,8 @@
         </p:nvSpPr>
         <p:spPr>
           <a:xfrm>
-            <a:off x="319309" y="2960948"/>
-            <a:ext cx="8821515" cy="1015663"/>
+            <a:off x="247386" y="4545124"/>
+            <a:ext cx="8821515" cy="1938992"/>
           </a:xfrm>
           <a:prstGeom prst="rect">
             <a:avLst/>
@@ -3530,7 +3682,38 @@
             </a:r>
             <a:r>
               <a:rPr lang="fr-FR" sz="2000" dirty="0"/>
-              <a:t> » : Définit si l’agent implémente une interface utilisateur.</a:t>
+              <a:t> » : Définit si l’agent implémente une interface utilisateur</a:t>
+            </a:r>
+            <a:r>
+              <a:rPr lang="fr-FR" sz="2000" dirty="0" smtClean="0"/>
+              <a:t>.</a:t>
+            </a:r>
+          </a:p>
+          <a:p>
+            <a:endParaRPr lang="fr-FR" sz="2000" dirty="0"/>
+          </a:p>
+          <a:p>
+            <a:r>
+              <a:rPr lang="fr-FR" sz="2000" dirty="0" smtClean="0"/>
+              <a:t>L’interface Web est accessible via l’URL :</a:t>
+            </a:r>
+          </a:p>
+          <a:p>
+            <a:pPr marL="1257300" lvl="2" indent="-342900">
+              <a:buFont typeface="Arial" panose="020B0604020202020204" pitchFamily="34" charset="0"/>
+              <a:buChar char="•"/>
+            </a:pPr>
+            <a:r>
+              <a:rPr lang="fr-FR" sz="2000" dirty="0" smtClean="0"/>
+              <a:t>« http</a:t>
+            </a:r>
+            <a:r>
+              <a:rPr lang="fr-FR" sz="2000" dirty="0"/>
+              <a:t>://</a:t>
+            </a:r>
+            <a:r>
+              <a:rPr lang="fr-FR" sz="2000" dirty="0" smtClean="0"/>
+              <a:t>localhost:8500/ui »</a:t>
             </a:r>
             <a:endParaRPr lang="fr-FR" sz="2000" dirty="0"/>
           </a:p>
@@ -3550,6 +3733,379 @@
 </file>
 
 <file path=ppt/slides/slide5.xml><?xml version="1.0" encoding="utf-8"?>
+<p:sld xmlns:a="http://schemas.openxmlformats.org/drawingml/2006/main" xmlns:r="http://schemas.openxmlformats.org/officeDocument/2006/relationships" xmlns:p="http://schemas.openxmlformats.org/presentationml/2006/main">
+  <p:cSld>
+    <p:spTree>
+      <p:nvGrpSpPr>
+        <p:cNvPr id="1" name=""/>
+        <p:cNvGrpSpPr/>
+        <p:nvPr/>
+      </p:nvGrpSpPr>
+      <p:grpSpPr>
+        <a:xfrm>
+          <a:off x="0" y="0"/>
+          <a:ext cx="0" cy="0"/>
+          <a:chOff x="0" y="0"/>
+          <a:chExt cx="0" cy="0"/>
+        </a:xfrm>
+      </p:grpSpPr>
+      <p:sp>
+        <p:nvSpPr>
+          <p:cNvPr id="2" name="ZoneTexte 1"/>
+          <p:cNvSpPr txBox="1"/>
+          <p:nvPr/>
+        </p:nvSpPr>
+        <p:spPr>
+          <a:xfrm>
+            <a:off x="-1" y="0"/>
+            <a:ext cx="9140825" cy="523220"/>
+          </a:xfrm>
+          <a:prstGeom prst="rect">
+            <a:avLst/>
+          </a:prstGeom>
+          <a:noFill/>
+        </p:spPr>
+        <p:txBody>
+          <a:bodyPr wrap="square" rtlCol="0">
+            <a:spAutoFit/>
+          </a:bodyPr>
+          <a:lstStyle/>
+          <a:p>
+            <a:r>
+              <a:rPr lang="fr-FR" sz="2800" dirty="0" smtClean="0">
+                <a:solidFill>
+                  <a:schemeClr val="accent4"/>
+                </a:solidFill>
+                <a:latin typeface="+mn-lt"/>
+              </a:rPr>
+              <a:t>Mise en place </a:t>
+            </a:r>
+            <a:r>
+              <a:rPr lang="fr-FR" sz="2800" dirty="0">
+                <a:solidFill>
+                  <a:schemeClr val="accent4"/>
+                </a:solidFill>
+                <a:latin typeface="+mn-lt"/>
+              </a:rPr>
+              <a:t>– </a:t>
+            </a:r>
+            <a:r>
+              <a:rPr lang="fr-FR" sz="2800" dirty="0" smtClean="0">
+                <a:solidFill>
+                  <a:schemeClr val="accent4"/>
+                </a:solidFill>
+                <a:latin typeface="+mn-lt"/>
+              </a:rPr>
+              <a:t>Exemple de fichier de configuration</a:t>
+            </a:r>
+            <a:endParaRPr lang="fr-FR" sz="2800" dirty="0">
+              <a:solidFill>
+                <a:schemeClr val="accent4"/>
+              </a:solidFill>
+              <a:latin typeface="+mn-lt"/>
+            </a:endParaRPr>
+          </a:p>
+        </p:txBody>
+      </p:sp>
+      <p:sp>
+        <p:nvSpPr>
+          <p:cNvPr id="3" name="ZoneTexte 2">
+            <a:extLst>
+              <a:ext uri="{FF2B5EF4-FFF2-40B4-BE49-F238E27FC236}">
+                <a16:creationId xmlns="" xmlns:a16="http://schemas.microsoft.com/office/drawing/2014/main" id="{02012D19-F34D-4179-AA25-13C4AC886B01}"/>
+              </a:ext>
+            </a:extLst>
+          </p:cNvPr>
+          <p:cNvSpPr txBox="1"/>
+          <p:nvPr/>
+        </p:nvSpPr>
+        <p:spPr>
+          <a:xfrm>
+            <a:off x="241581" y="872716"/>
+            <a:ext cx="8821515" cy="3754874"/>
+          </a:xfrm>
+          <a:prstGeom prst="rect">
+            <a:avLst/>
+          </a:prstGeom>
+          <a:noFill/>
+        </p:spPr>
+        <p:txBody>
+          <a:bodyPr wrap="square" rtlCol="0">
+            <a:spAutoFit/>
+          </a:bodyPr>
+          <a:lstStyle/>
+          <a:p>
+            <a:r>
+              <a:rPr lang="fr-FR" sz="2000" dirty="0" smtClean="0"/>
+              <a:t>Exemple de fichier JSON de configuration pour un serveur :</a:t>
+            </a:r>
+          </a:p>
+          <a:p>
+            <a:endParaRPr lang="fr-FR" sz="2000" dirty="0" smtClean="0"/>
+          </a:p>
+          <a:p>
+            <a:r>
+              <a:rPr lang="fr-FR" dirty="0">
+                <a:latin typeface="Courier New" panose="02070309020205020404" pitchFamily="49" charset="0"/>
+                <a:cs typeface="Courier New" panose="02070309020205020404" pitchFamily="49" charset="0"/>
+              </a:rPr>
+              <a:t>{</a:t>
+            </a:r>
+          </a:p>
+          <a:p>
+            <a:r>
+              <a:rPr lang="fr-FR" dirty="0" smtClean="0">
+                <a:latin typeface="Courier New" panose="02070309020205020404" pitchFamily="49" charset="0"/>
+                <a:cs typeface="Courier New" panose="02070309020205020404" pitchFamily="49" charset="0"/>
+              </a:rPr>
+              <a:t>  "</a:t>
+            </a:r>
+            <a:r>
+              <a:rPr lang="fr-FR" dirty="0">
+                <a:latin typeface="Courier New" panose="02070309020205020404" pitchFamily="49" charset="0"/>
+                <a:cs typeface="Courier New" panose="02070309020205020404" pitchFamily="49" charset="0"/>
+              </a:rPr>
+              <a:t>server": </a:t>
+            </a:r>
+            <a:r>
+              <a:rPr lang="fr-FR" dirty="0" err="1">
+                <a:latin typeface="Courier New" panose="02070309020205020404" pitchFamily="49" charset="0"/>
+                <a:cs typeface="Courier New" panose="02070309020205020404" pitchFamily="49" charset="0"/>
+              </a:rPr>
+              <a:t>true</a:t>
+            </a:r>
+            <a:r>
+              <a:rPr lang="fr-FR" dirty="0" smtClean="0">
+                <a:latin typeface="Courier New" panose="02070309020205020404" pitchFamily="49" charset="0"/>
+                <a:cs typeface="Courier New" panose="02070309020205020404" pitchFamily="49" charset="0"/>
+              </a:rPr>
+              <a:t>,</a:t>
+            </a:r>
+          </a:p>
+          <a:p>
+            <a:r>
+              <a:rPr lang="fr-FR" dirty="0">
+                <a:latin typeface="Courier New" panose="02070309020205020404" pitchFamily="49" charset="0"/>
+                <a:cs typeface="Courier New" panose="02070309020205020404" pitchFamily="49" charset="0"/>
+              </a:rPr>
+              <a:t> </a:t>
+            </a:r>
+            <a:r>
+              <a:rPr lang="fr-FR" dirty="0" smtClean="0">
+                <a:latin typeface="Courier New" panose="02070309020205020404" pitchFamily="49" charset="0"/>
+                <a:cs typeface="Courier New" panose="02070309020205020404" pitchFamily="49" charset="0"/>
+              </a:rPr>
+              <a:t> "</a:t>
+            </a:r>
+            <a:r>
+              <a:rPr lang="fr-FR" dirty="0" err="1">
+                <a:latin typeface="Courier New" panose="02070309020205020404" pitchFamily="49" charset="0"/>
+                <a:cs typeface="Courier New" panose="02070309020205020404" pitchFamily="49" charset="0"/>
+              </a:rPr>
+              <a:t>bootstrap</a:t>
+            </a:r>
+            <a:r>
+              <a:rPr lang="fr-FR" dirty="0">
+                <a:latin typeface="Courier New" panose="02070309020205020404" pitchFamily="49" charset="0"/>
+                <a:cs typeface="Courier New" panose="02070309020205020404" pitchFamily="49" charset="0"/>
+              </a:rPr>
+              <a:t>": false,</a:t>
+            </a:r>
+          </a:p>
+          <a:p>
+            <a:r>
+              <a:rPr lang="fr-FR" dirty="0" smtClean="0">
+                <a:latin typeface="Courier New" panose="02070309020205020404" pitchFamily="49" charset="0"/>
+                <a:cs typeface="Courier New" panose="02070309020205020404" pitchFamily="49" charset="0"/>
+              </a:rPr>
+              <a:t>  "</a:t>
+            </a:r>
+            <a:r>
+              <a:rPr lang="fr-FR" dirty="0" err="1">
+                <a:latin typeface="Courier New" panose="02070309020205020404" pitchFamily="49" charset="0"/>
+                <a:cs typeface="Courier New" panose="02070309020205020404" pitchFamily="49" charset="0"/>
+              </a:rPr>
+              <a:t>data_dir</a:t>
+            </a:r>
+            <a:r>
+              <a:rPr lang="fr-FR" dirty="0">
+                <a:latin typeface="Courier New" panose="02070309020205020404" pitchFamily="49" charset="0"/>
+                <a:cs typeface="Courier New" panose="02070309020205020404" pitchFamily="49" charset="0"/>
+              </a:rPr>
+              <a:t>": "/var/consul",</a:t>
+            </a:r>
+          </a:p>
+          <a:p>
+            <a:r>
+              <a:rPr lang="fr-FR" dirty="0">
+                <a:latin typeface="Courier New" panose="02070309020205020404" pitchFamily="49" charset="0"/>
+                <a:cs typeface="Courier New" panose="02070309020205020404" pitchFamily="49" charset="0"/>
+              </a:rPr>
+              <a:t>  "</a:t>
+            </a:r>
+            <a:r>
+              <a:rPr lang="fr-FR" dirty="0" err="1">
+                <a:latin typeface="Courier New" panose="02070309020205020404" pitchFamily="49" charset="0"/>
+                <a:cs typeface="Courier New" panose="02070309020205020404" pitchFamily="49" charset="0"/>
+              </a:rPr>
+              <a:t>start_join</a:t>
+            </a:r>
+            <a:r>
+              <a:rPr lang="fr-FR" dirty="0" smtClean="0">
+                <a:latin typeface="Courier New" panose="02070309020205020404" pitchFamily="49" charset="0"/>
+                <a:cs typeface="Courier New" panose="02070309020205020404" pitchFamily="49" charset="0"/>
+              </a:rPr>
+              <a:t>": [</a:t>
+            </a:r>
+          </a:p>
+          <a:p>
+            <a:r>
+              <a:rPr lang="fr-FR" dirty="0">
+                <a:latin typeface="Courier New" panose="02070309020205020404" pitchFamily="49" charset="0"/>
+                <a:cs typeface="Courier New" panose="02070309020205020404" pitchFamily="49" charset="0"/>
+              </a:rPr>
+              <a:t> </a:t>
+            </a:r>
+            <a:r>
+              <a:rPr lang="fr-FR" dirty="0" smtClean="0">
+                <a:latin typeface="Courier New" panose="02070309020205020404" pitchFamily="49" charset="0"/>
+                <a:cs typeface="Courier New" panose="02070309020205020404" pitchFamily="49" charset="0"/>
+              </a:rPr>
+              <a:t>     &lt;adresse IP du serveur 1 de consul&gt;,</a:t>
+            </a:r>
+          </a:p>
+          <a:p>
+            <a:r>
+              <a:rPr lang="fr-FR" dirty="0">
+                <a:latin typeface="Courier New" panose="02070309020205020404" pitchFamily="49" charset="0"/>
+                <a:cs typeface="Courier New" panose="02070309020205020404" pitchFamily="49" charset="0"/>
+              </a:rPr>
+              <a:t> </a:t>
+            </a:r>
+            <a:r>
+              <a:rPr lang="fr-FR" dirty="0" smtClean="0">
+                <a:latin typeface="Courier New" panose="02070309020205020404" pitchFamily="49" charset="0"/>
+                <a:cs typeface="Courier New" panose="02070309020205020404" pitchFamily="49" charset="0"/>
+              </a:rPr>
+              <a:t>     &lt;</a:t>
+            </a:r>
+            <a:r>
+              <a:rPr lang="fr-FR" dirty="0">
+                <a:latin typeface="Courier New" panose="02070309020205020404" pitchFamily="49" charset="0"/>
+                <a:cs typeface="Courier New" panose="02070309020205020404" pitchFamily="49" charset="0"/>
+              </a:rPr>
+              <a:t>adresse IP du serveur </a:t>
+            </a:r>
+            <a:r>
+              <a:rPr lang="fr-FR" dirty="0" smtClean="0">
+                <a:latin typeface="Courier New" panose="02070309020205020404" pitchFamily="49" charset="0"/>
+                <a:cs typeface="Courier New" panose="02070309020205020404" pitchFamily="49" charset="0"/>
+              </a:rPr>
+              <a:t>2 </a:t>
+            </a:r>
+            <a:r>
+              <a:rPr lang="fr-FR" dirty="0">
+                <a:latin typeface="Courier New" panose="02070309020205020404" pitchFamily="49" charset="0"/>
+                <a:cs typeface="Courier New" panose="02070309020205020404" pitchFamily="49" charset="0"/>
+              </a:rPr>
+              <a:t>de consul</a:t>
+            </a:r>
+            <a:r>
+              <a:rPr lang="fr-FR" dirty="0" smtClean="0">
+                <a:latin typeface="Courier New" panose="02070309020205020404" pitchFamily="49" charset="0"/>
+                <a:cs typeface="Courier New" panose="02070309020205020404" pitchFamily="49" charset="0"/>
+              </a:rPr>
+              <a:t>&gt;,</a:t>
+            </a:r>
+          </a:p>
+          <a:p>
+            <a:r>
+              <a:rPr lang="fr-FR" dirty="0">
+                <a:latin typeface="Courier New" panose="02070309020205020404" pitchFamily="49" charset="0"/>
+                <a:cs typeface="Courier New" panose="02070309020205020404" pitchFamily="49" charset="0"/>
+              </a:rPr>
+              <a:t> </a:t>
+            </a:r>
+            <a:r>
+              <a:rPr lang="fr-FR" dirty="0" smtClean="0">
+                <a:latin typeface="Courier New" panose="02070309020205020404" pitchFamily="49" charset="0"/>
+                <a:cs typeface="Courier New" panose="02070309020205020404" pitchFamily="49" charset="0"/>
+              </a:rPr>
+              <a:t>     …</a:t>
+            </a:r>
+          </a:p>
+          <a:p>
+            <a:r>
+              <a:rPr lang="fr-FR" dirty="0">
+                <a:latin typeface="Courier New" panose="02070309020205020404" pitchFamily="49" charset="0"/>
+                <a:cs typeface="Courier New" panose="02070309020205020404" pitchFamily="49" charset="0"/>
+              </a:rPr>
+              <a:t> </a:t>
+            </a:r>
+            <a:r>
+              <a:rPr lang="fr-FR" dirty="0" smtClean="0">
+                <a:latin typeface="Courier New" panose="02070309020205020404" pitchFamily="49" charset="0"/>
+                <a:cs typeface="Courier New" panose="02070309020205020404" pitchFamily="49" charset="0"/>
+              </a:rPr>
+              <a:t> ],</a:t>
+            </a:r>
+            <a:endParaRPr lang="fr-FR" dirty="0">
+              <a:latin typeface="Courier New" panose="02070309020205020404" pitchFamily="49" charset="0"/>
+              <a:cs typeface="Courier New" panose="02070309020205020404" pitchFamily="49" charset="0"/>
+            </a:endParaRPr>
+          </a:p>
+          <a:p>
+            <a:r>
+              <a:rPr lang="fr-FR" dirty="0">
+                <a:latin typeface="Courier New" panose="02070309020205020404" pitchFamily="49" charset="0"/>
+                <a:cs typeface="Courier New" panose="02070309020205020404" pitchFamily="49" charset="0"/>
+              </a:rPr>
+              <a:t>  "</a:t>
+            </a:r>
+            <a:r>
+              <a:rPr lang="fr-FR" dirty="0" err="1">
+                <a:latin typeface="Courier New" panose="02070309020205020404" pitchFamily="49" charset="0"/>
+                <a:cs typeface="Courier New" panose="02070309020205020404" pitchFamily="49" charset="0"/>
+              </a:rPr>
+              <a:t>bind_addr</a:t>
+            </a:r>
+            <a:r>
+              <a:rPr lang="fr-FR" dirty="0">
+                <a:latin typeface="Courier New" panose="02070309020205020404" pitchFamily="49" charset="0"/>
+                <a:cs typeface="Courier New" panose="02070309020205020404" pitchFamily="49" charset="0"/>
+              </a:rPr>
+              <a:t>": "&lt;adresse IP de la machine hôte&gt;"</a:t>
+            </a:r>
+          </a:p>
+          <a:p>
+            <a:r>
+              <a:rPr lang="fr-FR" dirty="0">
+                <a:latin typeface="Courier New" panose="02070309020205020404" pitchFamily="49" charset="0"/>
+                <a:cs typeface="Courier New" panose="02070309020205020404" pitchFamily="49" charset="0"/>
+              </a:rPr>
+              <a:t>}</a:t>
+            </a:r>
+            <a:endParaRPr lang="fr-FR" dirty="0">
+              <a:latin typeface="Courier New" panose="02070309020205020404" pitchFamily="49" charset="0"/>
+              <a:cs typeface="Courier New" panose="02070309020205020404" pitchFamily="49" charset="0"/>
+            </a:endParaRPr>
+          </a:p>
+        </p:txBody>
+      </p:sp>
+    </p:spTree>
+    <p:extLst>
+      <p:ext uri="{BB962C8B-B14F-4D97-AF65-F5344CB8AC3E}">
+        <p14:creationId xmlns:p14="http://schemas.microsoft.com/office/powerpoint/2010/main" val="3446841099"/>
+      </p:ext>
+    </p:extLst>
+  </p:cSld>
+  <p:clrMapOvr>
+    <a:masterClrMapping/>
+  </p:clrMapOvr>
+</p:sld>
+</file>
+
+<file path=ppt/slides/slide6.xml><?xml version="1.0" encoding="utf-8"?>
 <p:sld xmlns:a="http://schemas.openxmlformats.org/drawingml/2006/main" xmlns:r="http://schemas.openxmlformats.org/officeDocument/2006/relationships" xmlns:p="http://schemas.openxmlformats.org/presentationml/2006/main">
   <p:cSld>
     <p:spTree>
@@ -3682,182 +4238,6 @@
 </p:sld>
 </file>
 
-<file path=ppt/slides/slide6.xml><?xml version="1.0" encoding="utf-8"?>
-<p:sld xmlns:a="http://schemas.openxmlformats.org/drawingml/2006/main" xmlns:r="http://schemas.openxmlformats.org/officeDocument/2006/relationships" xmlns:p="http://schemas.openxmlformats.org/presentationml/2006/main">
-  <p:cSld>
-    <p:spTree>
-      <p:nvGrpSpPr>
-        <p:cNvPr id="1" name=""/>
-        <p:cNvGrpSpPr/>
-        <p:nvPr/>
-      </p:nvGrpSpPr>
-      <p:grpSpPr>
-        <a:xfrm>
-          <a:off x="0" y="0"/>
-          <a:ext cx="0" cy="0"/>
-          <a:chOff x="0" y="0"/>
-          <a:chExt cx="0" cy="0"/>
-        </a:xfrm>
-      </p:grpSpPr>
-      <p:sp>
-        <p:nvSpPr>
-          <p:cNvPr id="2" name="ZoneTexte 1"/>
-          <p:cNvSpPr txBox="1"/>
-          <p:nvPr/>
-        </p:nvSpPr>
-        <p:spPr>
-          <a:xfrm>
-            <a:off x="-1" y="0"/>
-            <a:ext cx="9140825" cy="523220"/>
-          </a:xfrm>
-          <a:prstGeom prst="rect">
-            <a:avLst/>
-          </a:prstGeom>
-          <a:noFill/>
-        </p:spPr>
-        <p:txBody>
-          <a:bodyPr wrap="square" rtlCol="0">
-            <a:spAutoFit/>
-          </a:bodyPr>
-          <a:lstStyle/>
-          <a:p>
-            <a:r>
-              <a:rPr lang="fr-FR" sz="2800" dirty="0" smtClean="0">
-                <a:solidFill>
-                  <a:schemeClr val="accent4"/>
-                </a:solidFill>
-                <a:latin typeface="+mn-lt"/>
-              </a:rPr>
-              <a:t>Mise en place – Démarrer un cluster</a:t>
-            </a:r>
-            <a:endParaRPr lang="fr-FR" sz="2800" dirty="0">
-              <a:solidFill>
-                <a:schemeClr val="accent4"/>
-              </a:solidFill>
-              <a:latin typeface="+mn-lt"/>
-            </a:endParaRPr>
-          </a:p>
-        </p:txBody>
-      </p:sp>
-      <p:sp>
-        <p:nvSpPr>
-          <p:cNvPr id="5" name="ZoneTexte 4">
-            <a:extLst>
-              <a:ext uri="{FF2B5EF4-FFF2-40B4-BE49-F238E27FC236}">
-                <a16:creationId xmlns:a16="http://schemas.microsoft.com/office/drawing/2014/main" xmlns="" id="{02012D19-F34D-4179-AA25-13C4AC886B01}"/>
-              </a:ext>
-            </a:extLst>
-          </p:cNvPr>
-          <p:cNvSpPr txBox="1"/>
-          <p:nvPr/>
-        </p:nvSpPr>
-        <p:spPr>
-          <a:xfrm>
-            <a:off x="241581" y="872716"/>
-            <a:ext cx="8821515" cy="3170099"/>
-          </a:xfrm>
-          <a:prstGeom prst="rect">
-            <a:avLst/>
-          </a:prstGeom>
-          <a:noFill/>
-        </p:spPr>
-        <p:txBody>
-          <a:bodyPr wrap="square" rtlCol="0">
-            <a:spAutoFit/>
-          </a:bodyPr>
-          <a:lstStyle/>
-          <a:p>
-            <a:r>
-              <a:rPr lang="fr-FR" sz="2000" dirty="0" smtClean="0"/>
-              <a:t>Afin de démarrer un cluster Consul il faut procéder comme suit :</a:t>
-            </a:r>
-          </a:p>
-          <a:p>
-            <a:endParaRPr lang="fr-FR" sz="2000" dirty="0"/>
-          </a:p>
-          <a:p>
-            <a:pPr marL="800100" lvl="1" indent="-342900">
-              <a:buFont typeface="Arial" panose="020B0604020202020204" pitchFamily="34" charset="0"/>
-              <a:buChar char="•"/>
-            </a:pPr>
-            <a:r>
-              <a:rPr lang="fr-FR" sz="2000" dirty="0" smtClean="0"/>
-              <a:t>Démarrer un premier serveur en « </a:t>
-            </a:r>
-            <a:r>
-              <a:rPr lang="fr-FR" sz="2000" dirty="0" err="1" smtClean="0"/>
-              <a:t>bootstrap</a:t>
-            </a:r>
-            <a:r>
-              <a:rPr lang="fr-FR" sz="2000" dirty="0" smtClean="0"/>
-              <a:t> mode »</a:t>
-            </a:r>
-          </a:p>
-          <a:p>
-            <a:pPr lvl="1"/>
-            <a:endParaRPr lang="fr-FR" sz="2000" dirty="0" smtClean="0"/>
-          </a:p>
-          <a:p>
-            <a:pPr marL="800100" lvl="1" indent="-342900">
-              <a:buFont typeface="Arial" panose="020B0604020202020204" pitchFamily="34" charset="0"/>
-              <a:buChar char="•"/>
-            </a:pPr>
-            <a:r>
-              <a:rPr lang="fr-FR" sz="2000" dirty="0" smtClean="0"/>
-              <a:t>Démarrer les autres serveurs une fois que le leader est initialisé</a:t>
-            </a:r>
-          </a:p>
-          <a:p>
-            <a:pPr lvl="1"/>
-            <a:endParaRPr lang="fr-FR" sz="2000" dirty="0" smtClean="0"/>
-          </a:p>
-          <a:p>
-            <a:pPr marL="800100" lvl="1" indent="-342900">
-              <a:buFont typeface="Arial" panose="020B0604020202020204" pitchFamily="34" charset="0"/>
-              <a:buChar char="•"/>
-            </a:pPr>
-            <a:r>
-              <a:rPr lang="fr-FR" sz="2000" dirty="0" smtClean="0"/>
-              <a:t>Couper le serveur </a:t>
-            </a:r>
-            <a:r>
-              <a:rPr lang="fr-FR" sz="2000" dirty="0" err="1" smtClean="0"/>
-              <a:t>bootstrap</a:t>
-            </a:r>
-            <a:r>
-              <a:rPr lang="fr-FR" sz="2000" dirty="0" smtClean="0"/>
-              <a:t> et le relancer en « standard » afin qu’une élection de leader sois faite entre tous les serveurs</a:t>
-            </a:r>
-          </a:p>
-          <a:p>
-            <a:pPr lvl="1"/>
-            <a:endParaRPr lang="fr-FR" sz="2000" dirty="0" smtClean="0"/>
-          </a:p>
-          <a:p>
-            <a:pPr marL="800100" lvl="1" indent="-342900">
-              <a:buFont typeface="Arial" panose="020B0604020202020204" pitchFamily="34" charset="0"/>
-              <a:buChar char="•"/>
-            </a:pPr>
-            <a:r>
-              <a:rPr lang="fr-FR" sz="2000" dirty="0" smtClean="0"/>
-              <a:t>Lancer les clients</a:t>
-            </a:r>
-          </a:p>
-        </p:txBody>
-      </p:sp>
-    </p:spTree>
-    <p:extLst>
-      <p:ext uri="{BB962C8B-B14F-4D97-AF65-F5344CB8AC3E}">
-        <p14:creationId xmlns:p14="http://schemas.microsoft.com/office/powerpoint/2010/main" val="1958763911"/>
-      </p:ext>
-    </p:extLst>
-  </p:cSld>
-  <p:clrMapOvr>
-    <a:masterClrMapping/>
-  </p:clrMapOvr>
-</p:sld>
-</file>
-
 <file path=ppt/slides/slide7.xml><?xml version="1.0" encoding="utf-8"?>
 <p:sld xmlns:a="http://schemas.openxmlformats.org/drawingml/2006/main" xmlns:r="http://schemas.openxmlformats.org/officeDocument/2006/relationships" xmlns:p="http://schemas.openxmlformats.org/presentationml/2006/main">
   <p:cSld>
@@ -3877,41 +4257,47 @@
       </p:grpSpPr>
       <p:sp>
         <p:nvSpPr>
-          <p:cNvPr id="2" name="ZoneTexte 1"/>
-          <p:cNvSpPr txBox="1"/>
+          <p:cNvPr id="5" name="Ellipse 4"/>
+          <p:cNvSpPr/>
           <p:nvPr/>
         </p:nvSpPr>
         <p:spPr>
           <a:xfrm>
-            <a:off x="-1" y="0"/>
-            <a:ext cx="9140825" cy="523220"/>
+            <a:off x="2405694" y="2173147"/>
+            <a:ext cx="4266524" cy="2711266"/>
           </a:xfrm>
-          <a:prstGeom prst="rect">
+          <a:prstGeom prst="ellipse">
             <a:avLst/>
           </a:prstGeom>
           <a:noFill/>
+          <a:ln>
+            <a:solidFill>
+              <a:srgbClr val="7030A0"/>
+            </a:solidFill>
+          </a:ln>
         </p:spPr>
+        <p:style>
+          <a:lnRef idx="2">
+            <a:schemeClr val="accent1">
+              <a:shade val="50000"/>
+            </a:schemeClr>
+          </a:lnRef>
+          <a:fillRef idx="1">
+            <a:schemeClr val="accent1"/>
+          </a:fillRef>
+          <a:effectRef idx="0">
+            <a:schemeClr val="accent1"/>
+          </a:effectRef>
+          <a:fontRef idx="minor">
+            <a:schemeClr val="lt1"/>
+          </a:fontRef>
+        </p:style>
         <p:txBody>
-          <a:bodyPr wrap="square" rtlCol="0">
-            <a:spAutoFit/>
-          </a:bodyPr>
+          <a:bodyPr rtlCol="0" anchor="ctr"/>
           <a:lstStyle/>
           <a:p>
-            <a:r>
-              <a:rPr lang="fr-FR" sz="2800" dirty="0" smtClean="0">
-                <a:solidFill>
-                  <a:schemeClr val="accent4"/>
-                </a:solidFill>
-                <a:latin typeface="+mn-lt"/>
-              </a:rPr>
-              <a:t>Mise en place – Démarrer un cluster</a:t>
-            </a:r>
-            <a:endParaRPr lang="fr-FR" sz="2800" dirty="0">
-              <a:solidFill>
-                <a:schemeClr val="accent4"/>
-              </a:solidFill>
-              <a:latin typeface="+mn-lt"/>
-            </a:endParaRPr>
+            <a:pPr algn="ctr"/>
+            <a:endParaRPr lang="fr-FR"/>
           </a:p>
         </p:txBody>
       </p:sp>
@@ -3920,7 +4306,7 @@
           <p:cNvPr id="15" name="Groupe 14">
             <a:extLst>
               <a:ext uri="{FF2B5EF4-FFF2-40B4-BE49-F238E27FC236}">
-                <a16:creationId xmlns="" xmlns:a16="http://schemas.microsoft.com/office/drawing/2014/main" xmlns:lc="http://schemas.openxmlformats.org/drawingml/2006/lockedCanvas" id="{E0E230ED-9E76-46B5-92C4-AB7962005D3F}"/>
+                <a16:creationId xmlns:lc="http://schemas.openxmlformats.org/drawingml/2006/lockedCanvas" xmlns:a16="http://schemas.microsoft.com/office/drawing/2014/main" xmlns="" id="{E0E230ED-9E76-46B5-92C4-AB7962005D3F}"/>
               </a:ext>
             </a:extLst>
           </p:cNvPr>
@@ -3934,13 +4320,16 @@
             <a:chOff x="2155105" y="3861048"/>
             <a:chExt cx="1336774" cy="720080"/>
           </a:xfrm>
+          <a:solidFill>
+            <a:schemeClr val="bg1"/>
+          </a:solidFill>
         </p:grpSpPr>
         <p:pic>
           <p:nvPicPr>
             <p:cNvPr id="26" name="Image 25">
               <a:extLst>
                 <a:ext uri="{FF2B5EF4-FFF2-40B4-BE49-F238E27FC236}">
-                  <a16:creationId xmlns="" xmlns:a16="http://schemas.microsoft.com/office/drawing/2014/main" xmlns:lc="http://schemas.openxmlformats.org/drawingml/2006/lockedCanvas" id="{8A3CA8B9-B9C7-4C5E-945E-30789F67099A}"/>
+                  <a16:creationId xmlns:lc="http://schemas.openxmlformats.org/drawingml/2006/lockedCanvas" xmlns:a16="http://schemas.microsoft.com/office/drawing/2014/main" xmlns="" id="{8A3CA8B9-B9C7-4C5E-945E-30789F67099A}"/>
                 </a:ext>
               </a:extLst>
             </p:cNvPr>
@@ -3963,12 +4352,13 @@
           </p:blipFill>
           <p:spPr>
             <a:xfrm>
-              <a:off x="2204095" y="3905903"/>
-              <a:ext cx="517589" cy="222637"/>
+              <a:off x="2204094" y="3905903"/>
+              <a:ext cx="612028" cy="263259"/>
             </a:xfrm>
             <a:prstGeom prst="rect">
               <a:avLst/>
             </a:prstGeom>
+            <a:grpFill/>
           </p:spPr>
         </p:pic>
         <p:sp>
@@ -3976,7 +4366,7 @@
             <p:cNvPr id="27" name="Rectangle à coins arrondis 26">
               <a:extLst>
                 <a:ext uri="{FF2B5EF4-FFF2-40B4-BE49-F238E27FC236}">
-                  <a16:creationId xmlns="" xmlns:a16="http://schemas.microsoft.com/office/drawing/2014/main" xmlns:lc="http://schemas.openxmlformats.org/drawingml/2006/lockedCanvas" id="{D95582EE-8B26-42D1-A65F-CB3D8ACB3AAF}"/>
+                  <a16:creationId xmlns:lc="http://schemas.openxmlformats.org/drawingml/2006/lockedCanvas" xmlns:a16="http://schemas.microsoft.com/office/drawing/2014/main" xmlns="" id="{D95582EE-8B26-42D1-A65F-CB3D8ACB3AAF}"/>
                 </a:ext>
               </a:extLst>
             </p:cNvPr>
@@ -3993,7 +4383,7 @@
                 <a:gd name="adj" fmla="val 9644"/>
               </a:avLst>
             </a:prstGeom>
-            <a:noFill/>
+            <a:grpFill/>
           </p:spPr>
           <p:style>
             <a:lnRef idx="2">
@@ -4147,10 +4537,50 @@
       </p:grpSp>
       <p:sp>
         <p:nvSpPr>
+          <p:cNvPr id="2" name="ZoneTexte 1"/>
+          <p:cNvSpPr txBox="1"/>
+          <p:nvPr/>
+        </p:nvSpPr>
+        <p:spPr>
+          <a:xfrm>
+            <a:off x="-1" y="0"/>
+            <a:ext cx="9140825" cy="523220"/>
+          </a:xfrm>
+          <a:prstGeom prst="rect">
+            <a:avLst/>
+          </a:prstGeom>
+          <a:noFill/>
+        </p:spPr>
+        <p:txBody>
+          <a:bodyPr wrap="square" rtlCol="0">
+            <a:spAutoFit/>
+          </a:bodyPr>
+          <a:lstStyle/>
+          <a:p>
+            <a:r>
+              <a:rPr lang="fr-FR" sz="2800" dirty="0" smtClean="0">
+                <a:solidFill>
+                  <a:schemeClr val="accent4"/>
+                </a:solidFill>
+                <a:latin typeface="+mn-lt"/>
+              </a:rPr>
+              <a:t>Mise en place – Démarrer un cluster</a:t>
+            </a:r>
+            <a:endParaRPr lang="fr-FR" sz="2800" dirty="0">
+              <a:solidFill>
+                <a:schemeClr val="accent4"/>
+              </a:solidFill>
+              <a:latin typeface="+mn-lt"/>
+            </a:endParaRPr>
+          </a:p>
+        </p:txBody>
+      </p:sp>
+      <p:sp>
+        <p:nvSpPr>
           <p:cNvPr id="25" name="Rectangle à coins arrondis 24">
             <a:extLst>
               <a:ext uri="{FF2B5EF4-FFF2-40B4-BE49-F238E27FC236}">
-                <a16:creationId xmlns="" xmlns:a16="http://schemas.microsoft.com/office/drawing/2014/main" xmlns:lc="http://schemas.openxmlformats.org/drawingml/2006/lockedCanvas" id="{8A4861F3-3648-4041-BBFF-4AAA68264099}"/>
+                <a16:creationId xmlns:lc="http://schemas.openxmlformats.org/drawingml/2006/lockedCanvas" xmlns:a16="http://schemas.microsoft.com/office/drawing/2014/main" xmlns="" id="{8A4861F3-3648-4041-BBFF-4AAA68264099}"/>
               </a:ext>
             </a:extLst>
           </p:cNvPr>
@@ -4167,7 +4597,9 @@
               <a:gd name="adj" fmla="val 9644"/>
             </a:avLst>
           </a:prstGeom>
-          <a:noFill/>
+          <a:solidFill>
+            <a:schemeClr val="bg1"/>
+          </a:solidFill>
         </p:spPr>
         <p:style>
           <a:lnRef idx="2">
@@ -4323,7 +4755,7 @@
           <p:cNvPr id="23" name="Rectangle à coins arrondis 22">
             <a:extLst>
               <a:ext uri="{FF2B5EF4-FFF2-40B4-BE49-F238E27FC236}">
-                <a16:creationId xmlns="" xmlns:a16="http://schemas.microsoft.com/office/drawing/2014/main" xmlns:lc="http://schemas.openxmlformats.org/drawingml/2006/lockedCanvas" id="{39EF6DF5-5B2C-46F6-9EF9-79BC9ADA4131}"/>
+                <a16:creationId xmlns:lc="http://schemas.openxmlformats.org/drawingml/2006/lockedCanvas" xmlns:a16="http://schemas.microsoft.com/office/drawing/2014/main" xmlns="" id="{39EF6DF5-5B2C-46F6-9EF9-79BC9ADA4131}"/>
               </a:ext>
             </a:extLst>
           </p:cNvPr>
@@ -4340,7 +4772,9 @@
               <a:gd name="adj" fmla="val 9644"/>
             </a:avLst>
           </a:prstGeom>
-          <a:noFill/>
+          <a:solidFill>
+            <a:schemeClr val="bg1"/>
+          </a:solidFill>
         </p:spPr>
         <p:style>
           <a:lnRef idx="2">
@@ -4496,7 +4930,7 @@
           <p:cNvPr id="18" name="Rectangle à coins arrondis 17">
             <a:extLst>
               <a:ext uri="{FF2B5EF4-FFF2-40B4-BE49-F238E27FC236}">
-                <a16:creationId xmlns="" xmlns:a16="http://schemas.microsoft.com/office/drawing/2014/main" xmlns:lc="http://schemas.openxmlformats.org/drawingml/2006/lockedCanvas" id="{73A81684-A042-48EE-B7E8-F8866E052C48}"/>
+                <a16:creationId xmlns:lc="http://schemas.openxmlformats.org/drawingml/2006/lockedCanvas" xmlns:a16="http://schemas.microsoft.com/office/drawing/2014/main" xmlns="" id="{73A81684-A042-48EE-B7E8-F8866E052C48}"/>
               </a:ext>
             </a:extLst>
           </p:cNvPr>
@@ -4668,98 +5102,12 @@
           </a:p>
         </p:txBody>
       </p:sp>
-      <p:cxnSp>
-        <p:nvCxnSpPr>
-          <p:cNvPr id="19" name="Connecteur droit avec flèche 18">
-            <a:extLst>
-              <a:ext uri="{FF2B5EF4-FFF2-40B4-BE49-F238E27FC236}">
-                <a16:creationId xmlns="" xmlns:a16="http://schemas.microsoft.com/office/drawing/2014/main" xmlns:lc="http://schemas.openxmlformats.org/drawingml/2006/lockedCanvas" id="{2671D7D3-4838-4656-8E59-51270B18B09E}"/>
-              </a:ext>
-            </a:extLst>
-          </p:cNvPr>
-          <p:cNvCxnSpPr>
-            <a:cxnSpLocks/>
-            <a:stCxn id="27" idx="0"/>
-            <a:endCxn id="25" idx="3"/>
-          </p:cNvCxnSpPr>
-          <p:nvPr/>
-        </p:nvCxnSpPr>
-        <p:spPr>
-          <a:xfrm flipV="1">
-            <a:off x="2347438" y="2012791"/>
-            <a:ext cx="1256706" cy="1200183"/>
-          </a:xfrm>
-          <a:prstGeom prst="straightConnector1">
-            <a:avLst/>
-          </a:prstGeom>
-          <a:ln w="25400">
-            <a:tailEnd type="none"/>
-          </a:ln>
-        </p:spPr>
-        <p:style>
-          <a:lnRef idx="1">
-            <a:schemeClr val="accent1"/>
-          </a:lnRef>
-          <a:fillRef idx="0">
-            <a:schemeClr val="accent1"/>
-          </a:fillRef>
-          <a:effectRef idx="0">
-            <a:schemeClr val="accent1"/>
-          </a:effectRef>
-          <a:fontRef idx="minor">
-            <a:schemeClr val="tx1"/>
-          </a:fontRef>
-        </p:style>
-      </p:cxnSp>
-      <p:cxnSp>
-        <p:nvCxnSpPr>
-          <p:cNvPr id="20" name="Connecteur droit avec flèche 19">
-            <a:extLst>
-              <a:ext uri="{FF2B5EF4-FFF2-40B4-BE49-F238E27FC236}">
-                <a16:creationId xmlns="" xmlns:a16="http://schemas.microsoft.com/office/drawing/2014/main" xmlns:lc="http://schemas.openxmlformats.org/drawingml/2006/lockedCanvas" id="{A0689A2F-8150-4EE8-86E5-36A4AD124EC4}"/>
-              </a:ext>
-            </a:extLst>
-          </p:cNvPr>
-          <p:cNvCxnSpPr>
-            <a:cxnSpLocks/>
-            <a:stCxn id="23" idx="0"/>
-            <a:endCxn id="25" idx="1"/>
-          </p:cNvCxnSpPr>
-          <p:nvPr/>
-        </p:nvCxnSpPr>
-        <p:spPr>
-          <a:xfrm flipH="1" flipV="1">
-            <a:off x="5475286" y="2012791"/>
-            <a:ext cx="1351613" cy="1200183"/>
-          </a:xfrm>
-          <a:prstGeom prst="straightConnector1">
-            <a:avLst/>
-          </a:prstGeom>
-          <a:ln w="25400">
-            <a:tailEnd type="none"/>
-          </a:ln>
-        </p:spPr>
-        <p:style>
-          <a:lnRef idx="1">
-            <a:schemeClr val="accent1"/>
-          </a:lnRef>
-          <a:fillRef idx="0">
-            <a:schemeClr val="accent1"/>
-          </a:fillRef>
-          <a:effectRef idx="0">
-            <a:schemeClr val="accent1"/>
-          </a:effectRef>
-          <a:fontRef idx="minor">
-            <a:schemeClr val="tx1"/>
-          </a:fontRef>
-        </p:style>
-      </p:cxnSp>
       <p:pic>
         <p:nvPicPr>
           <p:cNvPr id="37" name="Image 36">
             <a:extLst>
               <a:ext uri="{FF2B5EF4-FFF2-40B4-BE49-F238E27FC236}">
-                <a16:creationId xmlns="" xmlns:a16="http://schemas.microsoft.com/office/drawing/2014/main" xmlns:lc="http://schemas.openxmlformats.org/drawingml/2006/lockedCanvas" id="{8A3CA8B9-B9C7-4C5E-945E-30789F67099A}"/>
+                <a16:creationId xmlns:lc="http://schemas.openxmlformats.org/drawingml/2006/lockedCanvas" xmlns:a16="http://schemas.microsoft.com/office/drawing/2014/main" xmlns="" id="{8A3CA8B9-B9C7-4C5E-945E-30789F67099A}"/>
               </a:ext>
             </a:extLst>
           </p:cNvPr>
@@ -4782,44 +5130,8 @@
         </p:blipFill>
         <p:spPr>
           <a:xfrm>
-            <a:off x="3670684" y="1605531"/>
-            <a:ext cx="724492" cy="300767"/>
-          </a:xfrm>
-          <a:prstGeom prst="rect">
-            <a:avLst/>
-          </a:prstGeom>
-        </p:spPr>
-      </p:pic>
-      <p:pic>
-        <p:nvPicPr>
-          <p:cNvPr id="38" name="Image 37">
-            <a:extLst>
-              <a:ext uri="{FF2B5EF4-FFF2-40B4-BE49-F238E27FC236}">
-                <a16:creationId xmlns="" xmlns:a16="http://schemas.microsoft.com/office/drawing/2014/main" xmlns:lc="http://schemas.openxmlformats.org/drawingml/2006/lockedCanvas" id="{8A3CA8B9-B9C7-4C5E-945E-30789F67099A}"/>
-              </a:ext>
-            </a:extLst>
-          </p:cNvPr>
-          <p:cNvPicPr>
-            <a:picLocks noChangeAspect="1"/>
-          </p:cNvPicPr>
-          <p:nvPr/>
-        </p:nvPicPr>
-        <p:blipFill>
-          <a:blip r:embed="rId2" cstate="print">
-            <a:extLst>
-              <a:ext uri="{28A0092B-C50C-407E-A947-70E740481C1C}">
-                <a14:useLocalDpi xmlns:a14="http://schemas.microsoft.com/office/drawing/2010/main" val="0"/>
-              </a:ext>
-            </a:extLst>
-          </a:blip>
-          <a:stretch>
-            <a:fillRect/>
-          </a:stretch>
-        </p:blipFill>
-        <p:spPr>
-          <a:xfrm>
-            <a:off x="5947726" y="3248213"/>
-            <a:ext cx="724492" cy="300767"/>
+            <a:off x="3662670" y="1587704"/>
+            <a:ext cx="876286" cy="363783"/>
           </a:xfrm>
           <a:prstGeom prst="rect">
             <a:avLst/>
@@ -4921,7 +5233,7 @@
           <p:cNvPr id="45" name="Groupe 44">
             <a:extLst>
               <a:ext uri="{FF2B5EF4-FFF2-40B4-BE49-F238E27FC236}">
-                <a16:creationId xmlns="" xmlns:a16="http://schemas.microsoft.com/office/drawing/2014/main" xmlns:lc="http://schemas.openxmlformats.org/drawingml/2006/lockedCanvas" id="{E0E230ED-9E76-46B5-92C4-AB7962005D3F}"/>
+                <a16:creationId xmlns:lc="http://schemas.openxmlformats.org/drawingml/2006/lockedCanvas" xmlns:a16="http://schemas.microsoft.com/office/drawing/2014/main" xmlns="" id="{E0E230ED-9E76-46B5-92C4-AB7962005D3F}"/>
               </a:ext>
             </a:extLst>
           </p:cNvPr>
@@ -4935,13 +5247,16 @@
             <a:chOff x="2155105" y="3861048"/>
             <a:chExt cx="1336774" cy="720080"/>
           </a:xfrm>
+          <a:solidFill>
+            <a:schemeClr val="bg1"/>
+          </a:solidFill>
         </p:grpSpPr>
         <p:pic>
           <p:nvPicPr>
             <p:cNvPr id="46" name="Image 45">
               <a:extLst>
                 <a:ext uri="{FF2B5EF4-FFF2-40B4-BE49-F238E27FC236}">
-                  <a16:creationId xmlns="" xmlns:a16="http://schemas.microsoft.com/office/drawing/2014/main" xmlns:lc="http://schemas.openxmlformats.org/drawingml/2006/lockedCanvas" id="{8A3CA8B9-B9C7-4C5E-945E-30789F67099A}"/>
+                  <a16:creationId xmlns:lc="http://schemas.openxmlformats.org/drawingml/2006/lockedCanvas" xmlns:a16="http://schemas.microsoft.com/office/drawing/2014/main" xmlns="" id="{8A3CA8B9-B9C7-4C5E-945E-30789F67099A}"/>
                 </a:ext>
               </a:extLst>
             </p:cNvPr>
@@ -4970,6 +5285,7 @@
             <a:prstGeom prst="rect">
               <a:avLst/>
             </a:prstGeom>
+            <a:grpFill/>
           </p:spPr>
         </p:pic>
         <p:sp>
@@ -4977,7 +5293,7 @@
             <p:cNvPr id="47" name="Rectangle à coins arrondis 46">
               <a:extLst>
                 <a:ext uri="{FF2B5EF4-FFF2-40B4-BE49-F238E27FC236}">
-                  <a16:creationId xmlns="" xmlns:a16="http://schemas.microsoft.com/office/drawing/2014/main" xmlns:lc="http://schemas.openxmlformats.org/drawingml/2006/lockedCanvas" id="{D95582EE-8B26-42D1-A65F-CB3D8ACB3AAF}"/>
+                  <a16:creationId xmlns:lc="http://schemas.openxmlformats.org/drawingml/2006/lockedCanvas" xmlns:a16="http://schemas.microsoft.com/office/drawing/2014/main" xmlns="" id="{D95582EE-8B26-42D1-A65F-CB3D8ACB3AAF}"/>
                 </a:ext>
               </a:extLst>
             </p:cNvPr>
@@ -4994,7 +5310,7 @@
                 <a:gd name="adj" fmla="val 9644"/>
               </a:avLst>
             </a:prstGeom>
-            <a:noFill/>
+            <a:grpFill/>
           </p:spPr>
           <p:style>
             <a:lnRef idx="2">
@@ -5155,7 +5471,7 @@
         <p:spPr>
           <a:xfrm>
             <a:off x="2925919" y="4926263"/>
-            <a:ext cx="1116124" cy="538609"/>
+            <a:ext cx="1116124" cy="553998"/>
           </a:xfrm>
           <a:prstGeom prst="rect">
             <a:avLst/>
@@ -5176,18 +5492,18 @@
           <a:p>
             <a:pPr algn="ctr"/>
             <a:r>
-              <a:rPr lang="fr-FR" sz="1100" i="1" dirty="0" smtClean="0"/>
+              <a:rPr lang="fr-FR" sz="1200" i="1" dirty="0" smtClean="0"/>
               <a:t>&lt;</a:t>
             </a:r>
             <a:r>
-              <a:rPr lang="fr-FR" sz="1100" i="1" dirty="0" err="1" smtClean="0"/>
+              <a:rPr lang="fr-FR" sz="1200" i="1" dirty="0" err="1" smtClean="0"/>
               <a:t>ui</a:t>
             </a:r>
             <a:r>
-              <a:rPr lang="fr-FR" sz="1100" i="1" dirty="0" smtClean="0"/>
+              <a:rPr lang="fr-FR" sz="1200" i="1" dirty="0" smtClean="0"/>
               <a:t>&gt;</a:t>
             </a:r>
-            <a:endParaRPr lang="fr-FR" sz="1100" i="1" dirty="0"/>
+            <a:endParaRPr lang="fr-FR" sz="1200" i="1" dirty="0"/>
           </a:p>
         </p:txBody>
       </p:sp>
@@ -5196,7 +5512,7 @@
           <p:cNvPr id="49" name="Groupe 48">
             <a:extLst>
               <a:ext uri="{FF2B5EF4-FFF2-40B4-BE49-F238E27FC236}">
-                <a16:creationId xmlns="" xmlns:a16="http://schemas.microsoft.com/office/drawing/2014/main" xmlns:lc="http://schemas.openxmlformats.org/drawingml/2006/lockedCanvas" id="{E0E230ED-9E76-46B5-92C4-AB7962005D3F}"/>
+                <a16:creationId xmlns:lc="http://schemas.openxmlformats.org/drawingml/2006/lockedCanvas" xmlns:a16="http://schemas.microsoft.com/office/drawing/2014/main" xmlns="" id="{E0E230ED-9E76-46B5-92C4-AB7962005D3F}"/>
               </a:ext>
             </a:extLst>
           </p:cNvPr>
@@ -5210,13 +5526,16 @@
             <a:chOff x="2155105" y="3861048"/>
             <a:chExt cx="1336774" cy="720080"/>
           </a:xfrm>
+          <a:solidFill>
+            <a:schemeClr val="bg1"/>
+          </a:solidFill>
         </p:grpSpPr>
         <p:pic>
           <p:nvPicPr>
             <p:cNvPr id="50" name="Image 49">
               <a:extLst>
                 <a:ext uri="{FF2B5EF4-FFF2-40B4-BE49-F238E27FC236}">
-                  <a16:creationId xmlns="" xmlns:a16="http://schemas.microsoft.com/office/drawing/2014/main" xmlns:lc="http://schemas.openxmlformats.org/drawingml/2006/lockedCanvas" id="{8A3CA8B9-B9C7-4C5E-945E-30789F67099A}"/>
+                  <a16:creationId xmlns:lc="http://schemas.openxmlformats.org/drawingml/2006/lockedCanvas" xmlns:a16="http://schemas.microsoft.com/office/drawing/2014/main" xmlns="" id="{8A3CA8B9-B9C7-4C5E-945E-30789F67099A}"/>
                 </a:ext>
               </a:extLst>
             </p:cNvPr>
@@ -5245,6 +5564,7 @@
             <a:prstGeom prst="rect">
               <a:avLst/>
             </a:prstGeom>
+            <a:grpFill/>
           </p:spPr>
         </p:pic>
         <p:sp>
@@ -5252,7 +5572,7 @@
             <p:cNvPr id="51" name="Rectangle à coins arrondis 50">
               <a:extLst>
                 <a:ext uri="{FF2B5EF4-FFF2-40B4-BE49-F238E27FC236}">
-                  <a16:creationId xmlns="" xmlns:a16="http://schemas.microsoft.com/office/drawing/2014/main" xmlns:lc="http://schemas.openxmlformats.org/drawingml/2006/lockedCanvas" id="{D95582EE-8B26-42D1-A65F-CB3D8ACB3AAF}"/>
+                  <a16:creationId xmlns:lc="http://schemas.openxmlformats.org/drawingml/2006/lockedCanvas" xmlns:a16="http://schemas.microsoft.com/office/drawing/2014/main" xmlns="" id="{D95582EE-8B26-42D1-A65F-CB3D8ACB3AAF}"/>
                 </a:ext>
               </a:extLst>
             </p:cNvPr>
@@ -5269,7 +5589,7 @@
                 <a:gd name="adj" fmla="val 9644"/>
               </a:avLst>
             </a:prstGeom>
-            <a:noFill/>
+            <a:grpFill/>
           </p:spPr>
           <p:style>
             <a:lnRef idx="2">
@@ -5451,141 +5771,12 @@
           </a:p>
         </p:txBody>
       </p:sp>
-      <p:cxnSp>
-        <p:nvCxnSpPr>
-          <p:cNvPr id="53" name="Connecteur droit avec flèche 52">
-            <a:extLst>
-              <a:ext uri="{FF2B5EF4-FFF2-40B4-BE49-F238E27FC236}">
-                <a16:creationId xmlns="" xmlns:a16="http://schemas.microsoft.com/office/drawing/2014/main" xmlns:lc="http://schemas.openxmlformats.org/drawingml/2006/lockedCanvas" id="{2671D7D3-4838-4656-8E59-51270B18B09E}"/>
-              </a:ext>
-            </a:extLst>
-          </p:cNvPr>
-          <p:cNvCxnSpPr>
-            <a:cxnSpLocks/>
-            <a:stCxn id="47" idx="3"/>
-            <a:endCxn id="27" idx="2"/>
-          </p:cNvCxnSpPr>
-          <p:nvPr/>
-        </p:nvCxnSpPr>
-        <p:spPr>
-          <a:xfrm flipH="1" flipV="1">
-            <a:off x="2347438" y="4185753"/>
-            <a:ext cx="200972" cy="849969"/>
-          </a:xfrm>
-          <a:prstGeom prst="straightConnector1">
-            <a:avLst/>
-          </a:prstGeom>
-          <a:ln w="25400">
-            <a:tailEnd type="none"/>
-          </a:ln>
-        </p:spPr>
-        <p:style>
-          <a:lnRef idx="1">
-            <a:schemeClr val="accent1"/>
-          </a:lnRef>
-          <a:fillRef idx="0">
-            <a:schemeClr val="accent1"/>
-          </a:fillRef>
-          <a:effectRef idx="0">
-            <a:schemeClr val="accent1"/>
-          </a:effectRef>
-          <a:fontRef idx="minor">
-            <a:schemeClr val="tx1"/>
-          </a:fontRef>
-        </p:style>
-      </p:cxnSp>
-      <p:cxnSp>
-        <p:nvCxnSpPr>
-          <p:cNvPr id="54" name="Connecteur droit avec flèche 53">
-            <a:extLst>
-              <a:ext uri="{FF2B5EF4-FFF2-40B4-BE49-F238E27FC236}">
-                <a16:creationId xmlns="" xmlns:a16="http://schemas.microsoft.com/office/drawing/2014/main" xmlns:lc="http://schemas.openxmlformats.org/drawingml/2006/lockedCanvas" id="{2671D7D3-4838-4656-8E59-51270B18B09E}"/>
-              </a:ext>
-            </a:extLst>
-          </p:cNvPr>
-          <p:cNvCxnSpPr>
-            <a:cxnSpLocks/>
-            <a:stCxn id="51" idx="1"/>
-            <a:endCxn id="23" idx="2"/>
-          </p:cNvCxnSpPr>
-          <p:nvPr/>
-        </p:nvCxnSpPr>
-        <p:spPr>
-          <a:xfrm flipV="1">
-            <a:off x="6672218" y="4185753"/>
-            <a:ext cx="154681" cy="849970"/>
-          </a:xfrm>
-          <a:prstGeom prst="straightConnector1">
-            <a:avLst/>
-          </a:prstGeom>
-          <a:ln w="25400">
-            <a:tailEnd type="none"/>
-          </a:ln>
-        </p:spPr>
-        <p:style>
-          <a:lnRef idx="1">
-            <a:schemeClr val="accent1"/>
-          </a:lnRef>
-          <a:fillRef idx="0">
-            <a:schemeClr val="accent1"/>
-          </a:fillRef>
-          <a:effectRef idx="0">
-            <a:schemeClr val="accent1"/>
-          </a:effectRef>
-          <a:fontRef idx="minor">
-            <a:schemeClr val="tx1"/>
-          </a:fontRef>
-        </p:style>
-      </p:cxnSp>
-      <p:cxnSp>
-        <p:nvCxnSpPr>
-          <p:cNvPr id="60" name="Connecteur droit avec flèche 59">
-            <a:extLst>
-              <a:ext uri="{FF2B5EF4-FFF2-40B4-BE49-F238E27FC236}">
-                <a16:creationId xmlns="" xmlns:a16="http://schemas.microsoft.com/office/drawing/2014/main" xmlns:lc="http://schemas.openxmlformats.org/drawingml/2006/lockedCanvas" id="{2671D7D3-4838-4656-8E59-51270B18B09E}"/>
-              </a:ext>
-            </a:extLst>
-          </p:cNvPr>
-          <p:cNvCxnSpPr>
-            <a:cxnSpLocks/>
-            <a:stCxn id="51" idx="3"/>
-            <a:endCxn id="47" idx="1"/>
-          </p:cNvCxnSpPr>
-          <p:nvPr/>
-        </p:nvCxnSpPr>
-        <p:spPr>
-          <a:xfrm flipH="1" flipV="1">
-            <a:off x="4419552" y="5035722"/>
-            <a:ext cx="381524" cy="1"/>
-          </a:xfrm>
-          <a:prstGeom prst="straightConnector1">
-            <a:avLst/>
-          </a:prstGeom>
-          <a:ln w="25400">
-            <a:tailEnd type="none"/>
-          </a:ln>
-        </p:spPr>
-        <p:style>
-          <a:lnRef idx="1">
-            <a:schemeClr val="accent1"/>
-          </a:lnRef>
-          <a:fillRef idx="0">
-            <a:schemeClr val="accent1"/>
-          </a:fillRef>
-          <a:effectRef idx="0">
-            <a:schemeClr val="accent1"/>
-          </a:effectRef>
-          <a:fontRef idx="minor">
-            <a:schemeClr val="tx1"/>
-          </a:fontRef>
-        </p:style>
-      </p:cxnSp>
       <p:sp>
         <p:nvSpPr>
           <p:cNvPr id="65" name="Rectangle à coins arrondis 64">
             <a:extLst>
               <a:ext uri="{FF2B5EF4-FFF2-40B4-BE49-F238E27FC236}">
-                <a16:creationId xmlns="" xmlns:a16="http://schemas.microsoft.com/office/drawing/2014/main" xmlns:lc="http://schemas.openxmlformats.org/drawingml/2006/lockedCanvas" id="{D95582EE-8B26-42D1-A65F-CB3D8ACB3AAF}"/>
+                <a16:creationId xmlns:lc="http://schemas.openxmlformats.org/drawingml/2006/lockedCanvas" xmlns:a16="http://schemas.microsoft.com/office/drawing/2014/main" xmlns="" id="{D95582EE-8B26-42D1-A65F-CB3D8ACB3AAF}"/>
               </a:ext>
             </a:extLst>
           </p:cNvPr>
@@ -5789,7 +5980,7 @@
           <p:cNvPr id="67" name="Rectangle à coins arrondis 66">
             <a:extLst>
               <a:ext uri="{FF2B5EF4-FFF2-40B4-BE49-F238E27FC236}">
-                <a16:creationId xmlns="" xmlns:a16="http://schemas.microsoft.com/office/drawing/2014/main" xmlns:lc="http://schemas.openxmlformats.org/drawingml/2006/lockedCanvas" id="{D95582EE-8B26-42D1-A65F-CB3D8ACB3AAF}"/>
+                <a16:creationId xmlns:lc="http://schemas.openxmlformats.org/drawingml/2006/lockedCanvas" xmlns:a16="http://schemas.microsoft.com/office/drawing/2014/main" xmlns="" id="{D95582EE-8B26-42D1-A65F-CB3D8ACB3AAF}"/>
               </a:ext>
             </a:extLst>
           </p:cNvPr>
@@ -5993,7 +6184,7 @@
           <p:cNvPr id="69" name="Rectangle à coins arrondis 68">
             <a:extLst>
               <a:ext uri="{FF2B5EF4-FFF2-40B4-BE49-F238E27FC236}">
-                <a16:creationId xmlns="" xmlns:a16="http://schemas.microsoft.com/office/drawing/2014/main" xmlns:lc="http://schemas.openxmlformats.org/drawingml/2006/lockedCanvas" id="{D95582EE-8B26-42D1-A65F-CB3D8ACB3AAF}"/>
+                <a16:creationId xmlns:lc="http://schemas.openxmlformats.org/drawingml/2006/lockedCanvas" xmlns:a16="http://schemas.microsoft.com/office/drawing/2014/main" xmlns="" id="{D95582EE-8B26-42D1-A65F-CB3D8ACB3AAF}"/>
               </a:ext>
             </a:extLst>
           </p:cNvPr>
@@ -6197,7 +6388,7 @@
           <p:cNvPr id="71" name="Rectangle à coins arrondis 70">
             <a:extLst>
               <a:ext uri="{FF2B5EF4-FFF2-40B4-BE49-F238E27FC236}">
-                <a16:creationId xmlns="" xmlns:a16="http://schemas.microsoft.com/office/drawing/2014/main" xmlns:lc="http://schemas.openxmlformats.org/drawingml/2006/lockedCanvas" id="{D95582EE-8B26-42D1-A65F-CB3D8ACB3AAF}"/>
+                <a16:creationId xmlns:lc="http://schemas.openxmlformats.org/drawingml/2006/lockedCanvas" xmlns:a16="http://schemas.microsoft.com/office/drawing/2014/main" xmlns="" id="{D95582EE-8B26-42D1-A65F-CB3D8ACB3AAF}"/>
               </a:ext>
             </a:extLst>
           </p:cNvPr>
@@ -6401,7 +6592,7 @@
           <p:cNvPr id="73" name="Rectangle à coins arrondis 72">
             <a:extLst>
               <a:ext uri="{FF2B5EF4-FFF2-40B4-BE49-F238E27FC236}">
-                <a16:creationId xmlns="" xmlns:a16="http://schemas.microsoft.com/office/drawing/2014/main" xmlns:lc="http://schemas.openxmlformats.org/drawingml/2006/lockedCanvas" id="{D95582EE-8B26-42D1-A65F-CB3D8ACB3AAF}"/>
+                <a16:creationId xmlns:lc="http://schemas.openxmlformats.org/drawingml/2006/lockedCanvas" xmlns:a16="http://schemas.microsoft.com/office/drawing/2014/main" xmlns="" id="{D95582EE-8B26-42D1-A65F-CB3D8ACB3AAF}"/>
               </a:ext>
             </a:extLst>
           </p:cNvPr>
@@ -6605,7 +6796,7 @@
           <p:cNvPr id="75" name="Connecteur droit avec flèche 74">
             <a:extLst>
               <a:ext uri="{FF2B5EF4-FFF2-40B4-BE49-F238E27FC236}">
-                <a16:creationId xmlns="" xmlns:a16="http://schemas.microsoft.com/office/drawing/2014/main" xmlns:lc="http://schemas.openxmlformats.org/drawingml/2006/lockedCanvas" id="{2671D7D3-4838-4656-8E59-51270B18B09E}"/>
+                <a16:creationId xmlns:lc="http://schemas.openxmlformats.org/drawingml/2006/lockedCanvas" xmlns:a16="http://schemas.microsoft.com/office/drawing/2014/main" xmlns="" id="{2671D7D3-4838-4656-8E59-51270B18B09E}"/>
               </a:ext>
             </a:extLst>
           </p:cNvPr>
@@ -6648,7 +6839,7 @@
           <p:cNvPr id="80" name="Connecteur droit avec flèche 79">
             <a:extLst>
               <a:ext uri="{FF2B5EF4-FFF2-40B4-BE49-F238E27FC236}">
-                <a16:creationId xmlns="" xmlns:a16="http://schemas.microsoft.com/office/drawing/2014/main" xmlns:lc="http://schemas.openxmlformats.org/drawingml/2006/lockedCanvas" id="{2671D7D3-4838-4656-8E59-51270B18B09E}"/>
+                <a16:creationId xmlns:lc="http://schemas.openxmlformats.org/drawingml/2006/lockedCanvas" xmlns:a16="http://schemas.microsoft.com/office/drawing/2014/main" xmlns="" id="{2671D7D3-4838-4656-8E59-51270B18B09E}"/>
               </a:ext>
             </a:extLst>
           </p:cNvPr>
@@ -6691,7 +6882,7 @@
           <p:cNvPr id="84" name="Connecteur droit avec flèche 83">
             <a:extLst>
               <a:ext uri="{FF2B5EF4-FFF2-40B4-BE49-F238E27FC236}">
-                <a16:creationId xmlns="" xmlns:a16="http://schemas.microsoft.com/office/drawing/2014/main" xmlns:lc="http://schemas.openxmlformats.org/drawingml/2006/lockedCanvas" id="{2671D7D3-4838-4656-8E59-51270B18B09E}"/>
+                <a16:creationId xmlns:lc="http://schemas.openxmlformats.org/drawingml/2006/lockedCanvas" xmlns:a16="http://schemas.microsoft.com/office/drawing/2014/main" xmlns="" id="{2671D7D3-4838-4656-8E59-51270B18B09E}"/>
               </a:ext>
             </a:extLst>
           </p:cNvPr>
@@ -6734,7 +6925,7 @@
           <p:cNvPr id="88" name="Connecteur droit avec flèche 87">
             <a:extLst>
               <a:ext uri="{FF2B5EF4-FFF2-40B4-BE49-F238E27FC236}">
-                <a16:creationId xmlns="" xmlns:a16="http://schemas.microsoft.com/office/drawing/2014/main" xmlns:lc="http://schemas.openxmlformats.org/drawingml/2006/lockedCanvas" id="{2671D7D3-4838-4656-8E59-51270B18B09E}"/>
+                <a16:creationId xmlns:lc="http://schemas.openxmlformats.org/drawingml/2006/lockedCanvas" xmlns:a16="http://schemas.microsoft.com/office/drawing/2014/main" xmlns="" id="{2671D7D3-4838-4656-8E59-51270B18B09E}"/>
               </a:ext>
             </a:extLst>
           </p:cNvPr>
@@ -6777,7 +6968,7 @@
           <p:cNvPr id="91" name="Connecteur droit avec flèche 90">
             <a:extLst>
               <a:ext uri="{FF2B5EF4-FFF2-40B4-BE49-F238E27FC236}">
-                <a16:creationId xmlns="" xmlns:a16="http://schemas.microsoft.com/office/drawing/2014/main" xmlns:lc="http://schemas.openxmlformats.org/drawingml/2006/lockedCanvas" id="{2671D7D3-4838-4656-8E59-51270B18B09E}"/>
+                <a16:creationId xmlns:lc="http://schemas.openxmlformats.org/drawingml/2006/lockedCanvas" xmlns:a16="http://schemas.microsoft.com/office/drawing/2014/main" xmlns="" id="{2671D7D3-4838-4656-8E59-51270B18B09E}"/>
               </a:ext>
             </a:extLst>
           </p:cNvPr>
@@ -6815,6 +7006,226 @@
           </a:fontRef>
         </p:style>
       </p:cxnSp>
+      <p:sp>
+        <p:nvSpPr>
+          <p:cNvPr id="3" name="ZoneTexte 2"/>
+          <p:cNvSpPr txBox="1"/>
+          <p:nvPr/>
+        </p:nvSpPr>
+        <p:spPr>
+          <a:xfrm>
+            <a:off x="1277890" y="1440236"/>
+            <a:ext cx="1697901" cy="369332"/>
+          </a:xfrm>
+          <a:prstGeom prst="rect">
+            <a:avLst/>
+          </a:prstGeom>
+          <a:noFill/>
+        </p:spPr>
+        <p:txBody>
+          <a:bodyPr wrap="none" rtlCol="0">
+            <a:spAutoFit/>
+          </a:bodyPr>
+          <a:lstStyle/>
+          <a:p>
+            <a:r>
+              <a:rPr lang="fr-FR" dirty="0" smtClean="0"/>
+              <a:t>Cluster Consul</a:t>
+            </a:r>
+            <a:endParaRPr lang="fr-FR" dirty="0"/>
+          </a:p>
+        </p:txBody>
+      </p:sp>
+      <p:pic>
+        <p:nvPicPr>
+          <p:cNvPr id="55" name="Image 54">
+            <a:extLst>
+              <a:ext uri="{FF2B5EF4-FFF2-40B4-BE49-F238E27FC236}">
+                <a16:creationId xmlns:lc="http://schemas.openxmlformats.org/drawingml/2006/lockedCanvas" xmlns:a16="http://schemas.microsoft.com/office/drawing/2014/main" xmlns="" id="{8A3CA8B9-B9C7-4C5E-945E-30789F67099A}"/>
+              </a:ext>
+            </a:extLst>
+          </p:cNvPr>
+          <p:cNvPicPr>
+            <a:picLocks noChangeAspect="1"/>
+          </p:cNvPicPr>
+          <p:nvPr/>
+        </p:nvPicPr>
+        <p:blipFill>
+          <a:blip r:embed="rId2" cstate="print">
+            <a:extLst>
+              <a:ext uri="{28A0092B-C50C-407E-A947-70E740481C1C}">
+                <a14:useLocalDpi xmlns:a14="http://schemas.microsoft.com/office/drawing/2010/main" val="0"/>
+              </a:ext>
+            </a:extLst>
+          </a:blip>
+          <a:stretch>
+            <a:fillRect/>
+          </a:stretch>
+        </p:blipFill>
+        <p:spPr>
+          <a:xfrm>
+            <a:off x="1495122" y="3251822"/>
+            <a:ext cx="876286" cy="363783"/>
+          </a:xfrm>
+          <a:prstGeom prst="rect">
+            <a:avLst/>
+          </a:prstGeom>
+        </p:spPr>
+      </p:pic>
+      <p:pic>
+        <p:nvPicPr>
+          <p:cNvPr id="56" name="Image 55">
+            <a:extLst>
+              <a:ext uri="{FF2B5EF4-FFF2-40B4-BE49-F238E27FC236}">
+                <a16:creationId xmlns:lc="http://schemas.openxmlformats.org/drawingml/2006/lockedCanvas" xmlns:a16="http://schemas.microsoft.com/office/drawing/2014/main" xmlns="" id="{8A3CA8B9-B9C7-4C5E-945E-30789F67099A}"/>
+              </a:ext>
+            </a:extLst>
+          </p:cNvPr>
+          <p:cNvPicPr>
+            <a:picLocks noChangeAspect="1"/>
+          </p:cNvPicPr>
+          <p:nvPr/>
+        </p:nvPicPr>
+        <p:blipFill>
+          <a:blip r:embed="rId2" cstate="print">
+            <a:extLst>
+              <a:ext uri="{28A0092B-C50C-407E-A947-70E740481C1C}">
+                <a14:useLocalDpi xmlns:a14="http://schemas.microsoft.com/office/drawing/2010/main" val="0"/>
+              </a:ext>
+            </a:extLst>
+          </a:blip>
+          <a:stretch>
+            <a:fillRect/>
+          </a:stretch>
+        </p:blipFill>
+        <p:spPr>
+          <a:xfrm>
+            <a:off x="2616983" y="4584994"/>
+            <a:ext cx="876286" cy="363783"/>
+          </a:xfrm>
+          <a:prstGeom prst="rect">
+            <a:avLst/>
+          </a:prstGeom>
+        </p:spPr>
+      </p:pic>
+      <p:pic>
+        <p:nvPicPr>
+          <p:cNvPr id="57" name="Image 56">
+            <a:extLst>
+              <a:ext uri="{FF2B5EF4-FFF2-40B4-BE49-F238E27FC236}">
+                <a16:creationId xmlns:lc="http://schemas.openxmlformats.org/drawingml/2006/lockedCanvas" xmlns:a16="http://schemas.microsoft.com/office/drawing/2014/main" xmlns="" id="{8A3CA8B9-B9C7-4C5E-945E-30789F67099A}"/>
+              </a:ext>
+            </a:extLst>
+          </p:cNvPr>
+          <p:cNvPicPr>
+            <a:picLocks noChangeAspect="1"/>
+          </p:cNvPicPr>
+          <p:nvPr/>
+        </p:nvPicPr>
+        <p:blipFill>
+          <a:blip r:embed="rId2" cstate="print">
+            <a:extLst>
+              <a:ext uri="{28A0092B-C50C-407E-A947-70E740481C1C}">
+                <a14:useLocalDpi xmlns:a14="http://schemas.microsoft.com/office/drawing/2010/main" val="0"/>
+              </a:ext>
+            </a:extLst>
+          </a:blip>
+          <a:stretch>
+            <a:fillRect/>
+          </a:stretch>
+        </p:blipFill>
+        <p:spPr>
+          <a:xfrm>
+            <a:off x="4857277" y="4576416"/>
+            <a:ext cx="876286" cy="363783"/>
+          </a:xfrm>
+          <a:prstGeom prst="rect">
+            <a:avLst/>
+          </a:prstGeom>
+        </p:spPr>
+      </p:pic>
+      <p:pic>
+        <p:nvPicPr>
+          <p:cNvPr id="58" name="Image 57">
+            <a:extLst>
+              <a:ext uri="{FF2B5EF4-FFF2-40B4-BE49-F238E27FC236}">
+                <a16:creationId xmlns:lc="http://schemas.openxmlformats.org/drawingml/2006/lockedCanvas" xmlns:a16="http://schemas.microsoft.com/office/drawing/2014/main" xmlns="" id="{8A3CA8B9-B9C7-4C5E-945E-30789F67099A}"/>
+              </a:ext>
+            </a:extLst>
+          </p:cNvPr>
+          <p:cNvPicPr>
+            <a:picLocks noChangeAspect="1"/>
+          </p:cNvPicPr>
+          <p:nvPr/>
+        </p:nvPicPr>
+        <p:blipFill>
+          <a:blip r:embed="rId2" cstate="print">
+            <a:extLst>
+              <a:ext uri="{28A0092B-C50C-407E-A947-70E740481C1C}">
+                <a14:useLocalDpi xmlns:a14="http://schemas.microsoft.com/office/drawing/2010/main" val="0"/>
+              </a:ext>
+            </a:extLst>
+          </a:blip>
+          <a:stretch>
+            <a:fillRect/>
+          </a:stretch>
+        </p:blipFill>
+        <p:spPr>
+          <a:xfrm>
+            <a:off x="5950613" y="3237770"/>
+            <a:ext cx="876286" cy="363783"/>
+          </a:xfrm>
+          <a:prstGeom prst="rect">
+            <a:avLst/>
+          </a:prstGeom>
+        </p:spPr>
+      </p:pic>
+      <p:sp>
+        <p:nvSpPr>
+          <p:cNvPr id="6" name="ZoneTexte 5"/>
+          <p:cNvSpPr txBox="1"/>
+          <p:nvPr/>
+        </p:nvSpPr>
+        <p:spPr>
+          <a:xfrm>
+            <a:off x="5916664" y="2173147"/>
+            <a:ext cx="1941557" cy="369332"/>
+          </a:xfrm>
+          <a:prstGeom prst="rect">
+            <a:avLst/>
+          </a:prstGeom>
+          <a:noFill/>
+        </p:spPr>
+        <p:txBody>
+          <a:bodyPr wrap="none" rtlCol="0">
+            <a:spAutoFit/>
+          </a:bodyPr>
+          <a:lstStyle/>
+          <a:p>
+            <a:r>
+              <a:rPr lang="fr-FR" dirty="0" smtClean="0">
+                <a:solidFill>
+                  <a:srgbClr val="7030A0"/>
+                </a:solidFill>
+              </a:rPr>
+              <a:t>Protocole </a:t>
+            </a:r>
+            <a:r>
+              <a:rPr lang="fr-FR" dirty="0" err="1" smtClean="0">
+                <a:solidFill>
+                  <a:srgbClr val="7030A0"/>
+                </a:solidFill>
+              </a:rPr>
+              <a:t>Gossip</a:t>
+            </a:r>
+            <a:endParaRPr lang="fr-FR" dirty="0">
+              <a:solidFill>
+                <a:srgbClr val="7030A0"/>
+              </a:solidFill>
+            </a:endParaRPr>
+          </a:p>
+        </p:txBody>
+      </p:sp>
     </p:spTree>
     <p:extLst>
       <p:ext uri="{BB962C8B-B14F-4D97-AF65-F5344CB8AC3E}">
@@ -6832,6 +7243,216 @@
       </p:par>
     </p:tnLst>
   </p:timing>
+</p:sld>
+</file>
+
+<file path=ppt/slides/slide8.xml><?xml version="1.0" encoding="utf-8"?>
+<p:sld xmlns:a="http://schemas.openxmlformats.org/drawingml/2006/main" xmlns:r="http://schemas.openxmlformats.org/officeDocument/2006/relationships" xmlns:p="http://schemas.openxmlformats.org/presentationml/2006/main">
+  <p:cSld>
+    <p:spTree>
+      <p:nvGrpSpPr>
+        <p:cNvPr id="1" name=""/>
+        <p:cNvGrpSpPr/>
+        <p:nvPr/>
+      </p:nvGrpSpPr>
+      <p:grpSpPr>
+        <a:xfrm>
+          <a:off x="0" y="0"/>
+          <a:ext cx="0" cy="0"/>
+          <a:chOff x="0" y="0"/>
+          <a:chExt cx="0" cy="0"/>
+        </a:xfrm>
+      </p:grpSpPr>
+      <p:sp>
+        <p:nvSpPr>
+          <p:cNvPr id="2" name="ZoneTexte 1"/>
+          <p:cNvSpPr txBox="1"/>
+          <p:nvPr/>
+        </p:nvSpPr>
+        <p:spPr>
+          <a:xfrm>
+            <a:off x="-1" y="0"/>
+            <a:ext cx="9140825" cy="523220"/>
+          </a:xfrm>
+          <a:prstGeom prst="rect">
+            <a:avLst/>
+          </a:prstGeom>
+          <a:noFill/>
+        </p:spPr>
+        <p:txBody>
+          <a:bodyPr wrap="square" rtlCol="0">
+            <a:spAutoFit/>
+          </a:bodyPr>
+          <a:lstStyle/>
+          <a:p>
+            <a:r>
+              <a:rPr lang="fr-FR" sz="2800" dirty="0" smtClean="0">
+                <a:solidFill>
+                  <a:schemeClr val="accent4"/>
+                </a:solidFill>
+                <a:latin typeface="+mn-lt"/>
+              </a:rPr>
+              <a:t>Mise en place – Démarrer un cluster</a:t>
+            </a:r>
+            <a:endParaRPr lang="fr-FR" sz="2800" dirty="0">
+              <a:solidFill>
+                <a:schemeClr val="accent4"/>
+              </a:solidFill>
+              <a:latin typeface="+mn-lt"/>
+            </a:endParaRPr>
+          </a:p>
+        </p:txBody>
+      </p:sp>
+      <p:sp>
+        <p:nvSpPr>
+          <p:cNvPr id="5" name="ZoneTexte 4">
+            <a:extLst>
+              <a:ext uri="{FF2B5EF4-FFF2-40B4-BE49-F238E27FC236}">
+                <a16:creationId xmlns="" xmlns:a16="http://schemas.microsoft.com/office/drawing/2014/main" id="{02012D19-F34D-4179-AA25-13C4AC886B01}"/>
+              </a:ext>
+            </a:extLst>
+          </p:cNvPr>
+          <p:cNvSpPr txBox="1"/>
+          <p:nvPr/>
+        </p:nvSpPr>
+        <p:spPr>
+          <a:xfrm>
+            <a:off x="241581" y="872716"/>
+            <a:ext cx="8821515" cy="4093428"/>
+          </a:xfrm>
+          <a:prstGeom prst="rect">
+            <a:avLst/>
+          </a:prstGeom>
+          <a:noFill/>
+        </p:spPr>
+        <p:txBody>
+          <a:bodyPr wrap="square" rtlCol="0">
+            <a:spAutoFit/>
+          </a:bodyPr>
+          <a:lstStyle/>
+          <a:p>
+            <a:r>
+              <a:rPr lang="fr-FR" sz="2000" dirty="0" smtClean="0"/>
+              <a:t>Afin de démarrer un cluster Consul il faut procéder comme suit :</a:t>
+            </a:r>
+          </a:p>
+          <a:p>
+            <a:endParaRPr lang="fr-FR" sz="2000" dirty="0"/>
+          </a:p>
+          <a:p>
+            <a:pPr marL="800100" lvl="1" indent="-342900">
+              <a:buFont typeface="Arial" panose="020B0604020202020204" pitchFamily="34" charset="0"/>
+              <a:buChar char="•"/>
+            </a:pPr>
+            <a:r>
+              <a:rPr lang="fr-FR" sz="2000" dirty="0" smtClean="0"/>
+              <a:t>Démarrer un premier serveur en </a:t>
+            </a:r>
+            <a:r>
+              <a:rPr lang="fr-FR" sz="2000" dirty="0" smtClean="0"/>
+              <a:t>t	</a:t>
+            </a:r>
+            <a:r>
+              <a:rPr lang="fr-FR" sz="2000" dirty="0" err="1" smtClean="0"/>
+              <a:t>ant</a:t>
+            </a:r>
+            <a:r>
+              <a:rPr lang="fr-FR" sz="2000" dirty="0" smtClean="0"/>
+              <a:t> que leader avec un fichier de configuration avec l’option « </a:t>
+            </a:r>
+            <a:r>
+              <a:rPr lang="fr-FR" sz="2000" b="1" dirty="0" err="1" smtClean="0"/>
+              <a:t>bootstrap</a:t>
+            </a:r>
+            <a:r>
+              <a:rPr lang="fr-FR" sz="2000" dirty="0" smtClean="0"/>
+              <a:t> » à </a:t>
+            </a:r>
+            <a:r>
+              <a:rPr lang="fr-FR" sz="2000" dirty="0" err="1" smtClean="0">
+                <a:latin typeface="Courier New" panose="02070309020205020404" pitchFamily="49" charset="0"/>
+                <a:cs typeface="Courier New" panose="02070309020205020404" pitchFamily="49" charset="0"/>
+              </a:rPr>
+              <a:t>true</a:t>
+            </a:r>
+            <a:endParaRPr lang="fr-FR" sz="2000" dirty="0" smtClean="0">
+              <a:latin typeface="Courier New" panose="02070309020205020404" pitchFamily="49" charset="0"/>
+              <a:cs typeface="Courier New" panose="02070309020205020404" pitchFamily="49" charset="0"/>
+            </a:endParaRPr>
+          </a:p>
+          <a:p>
+            <a:pPr lvl="1"/>
+            <a:endParaRPr lang="fr-FR" sz="2000" dirty="0" smtClean="0"/>
+          </a:p>
+          <a:p>
+            <a:pPr marL="800100" lvl="1" indent="-342900">
+              <a:buFont typeface="Arial" panose="020B0604020202020204" pitchFamily="34" charset="0"/>
+              <a:buChar char="•"/>
+            </a:pPr>
+            <a:r>
+              <a:rPr lang="fr-FR" sz="2000" dirty="0" smtClean="0"/>
+              <a:t>Démarrer les autres </a:t>
+            </a:r>
+            <a:r>
+              <a:rPr lang="fr-FR" sz="2000" dirty="0" smtClean="0"/>
+              <a:t>serveurs, en mode normal, </a:t>
+            </a:r>
+            <a:r>
+              <a:rPr lang="fr-FR" sz="2000" dirty="0" smtClean="0"/>
+              <a:t>une fois que le leader est initialisé</a:t>
+            </a:r>
+          </a:p>
+          <a:p>
+            <a:pPr lvl="1"/>
+            <a:endParaRPr lang="fr-FR" sz="2000" dirty="0" smtClean="0"/>
+          </a:p>
+          <a:p>
+            <a:pPr marL="800100" lvl="1" indent="-342900">
+              <a:buFont typeface="Arial" panose="020B0604020202020204" pitchFamily="34" charset="0"/>
+              <a:buChar char="•"/>
+            </a:pPr>
+            <a:r>
+              <a:rPr lang="fr-FR" sz="2000" dirty="0" smtClean="0"/>
+              <a:t>Couper le serveur lancé en « </a:t>
+            </a:r>
+            <a:r>
+              <a:rPr lang="fr-FR" sz="2000" b="1" dirty="0" err="1" smtClean="0"/>
+              <a:t>bootstrap</a:t>
+            </a:r>
+            <a:r>
+              <a:rPr lang="fr-FR" sz="2000" dirty="0" smtClean="0"/>
+              <a:t> » et le relancer de façon normale afin que tous les serveurs soient au même niveau hiérarchique et que ce dernier ne prenne pas de décisions seul.</a:t>
+            </a:r>
+          </a:p>
+          <a:p>
+            <a:pPr marL="800100" lvl="1" indent="-342900">
+              <a:buFont typeface="Arial" panose="020B0604020202020204" pitchFamily="34" charset="0"/>
+              <a:buChar char="•"/>
+            </a:pPr>
+            <a:endParaRPr lang="fr-FR" sz="2000" dirty="0"/>
+          </a:p>
+          <a:p>
+            <a:pPr marL="800100" lvl="1" indent="-342900">
+              <a:buFont typeface="Arial" panose="020B0604020202020204" pitchFamily="34" charset="0"/>
+              <a:buChar char="•"/>
+            </a:pPr>
+            <a:r>
+              <a:rPr lang="fr-FR" sz="2000" dirty="0" smtClean="0"/>
+              <a:t> Lancer les clients en leur indiquant dans leur fichier de configuration </a:t>
+            </a:r>
+          </a:p>
+        </p:txBody>
+      </p:sp>
+    </p:spTree>
+    <p:extLst>
+      <p:ext uri="{BB962C8B-B14F-4D97-AF65-F5344CB8AC3E}">
+        <p14:creationId xmlns:p14="http://schemas.microsoft.com/office/powerpoint/2010/main" val="1958763911"/>
+      </p:ext>
+    </p:extLst>
+  </p:cSld>
+  <p:clrMapOvr>
+    <a:masterClrMapping/>
+  </p:clrMapOvr>
 </p:sld>
 </file>
 
@@ -7685,6 +8306,21 @@
 </file>
 
 <file path=customXml/item1.xml><?xml version="1.0" encoding="utf-8"?>
+<?mso-contentType ?>
+<FormTemplates xmlns="http://schemas.microsoft.com/sharepoint/v3/contenttype/forms">
+  <Display>DocumentLibraryForm</Display>
+  <Edit>DocumentLibraryForm</Edit>
+  <New>DocumentLibraryForm</New>
+</FormTemplates>
+</file>
+
+<file path=customXml/item2.xml><?xml version="1.0" encoding="utf-8"?>
+<p:properties xmlns:p="http://schemas.microsoft.com/office/2006/metadata/properties" xmlns:xsi="http://www.w3.org/2001/XMLSchema-instance">
+  <documentManagement/>
+</p:properties>
+</file>
+
+<file path=customXml/item3.xml><?xml version="1.0" encoding="utf-8"?>
 <ct:contentTypeSchema xmlns:ct="http://schemas.microsoft.com/office/2006/metadata/contentType" xmlns:ma="http://schemas.microsoft.com/office/2006/metadata/properties/metaAttributes" ct:_="" ma:_="" ma:contentTypeName="Document" ma:contentTypeID="0x010100F49F5C96A9C233488EAEF86BAE9BB0DC" ma:contentTypeVersion="0" ma:contentTypeDescription="Crée un document." ma:contentTypeScope="" ma:versionID="c8256f7601edc3bbc79255dd618ac8b0">
   <xsd:schema xmlns:xsd="http://www.w3.org/2001/XMLSchema" xmlns:p="http://schemas.microsoft.com/office/2006/metadata/properties" targetNamespace="http://schemas.microsoft.com/office/2006/metadata/properties" ma:root="true" ma:fieldsID="75019ab185b48580fc336df4da24a70b">
     <xsd:element name="properties">
@@ -7733,32 +8369,10 @@
 </ct:contentTypeSchema>
 </file>
 
-<file path=customXml/item2.xml><?xml version="1.0" encoding="utf-8"?>
-<p:properties xmlns:p="http://schemas.microsoft.com/office/2006/metadata/properties" xmlns:xsi="http://www.w3.org/2001/XMLSchema-instance">
-  <documentManagement/>
-</p:properties>
-</file>
-
-<file path=customXml/item3.xml><?xml version="1.0" encoding="utf-8"?>
-<?mso-contentType ?>
-<FormTemplates xmlns="http://schemas.microsoft.com/sharepoint/v3/contenttype/forms">
-  <Display>DocumentLibraryForm</Display>
-  <Edit>DocumentLibraryForm</Edit>
-  <New>DocumentLibraryForm</New>
-</FormTemplates>
-</file>
-
 <file path=customXml/itemProps1.xml><?xml version="1.0" encoding="utf-8"?>
-<ds:datastoreItem xmlns:ds="http://schemas.openxmlformats.org/officeDocument/2006/customXml" ds:itemID="{2EC21DD8-FAB6-4DD4-BCDC-FCBD54F1B193}">
+<ds:datastoreItem xmlns:ds="http://schemas.openxmlformats.org/officeDocument/2006/customXml" ds:itemID="{3B12FB4F-A943-493B-B875-6D5D04C611C6}">
   <ds:schemaRefs>
-    <ds:schemaRef ds:uri="http://schemas.microsoft.com/office/2006/metadata/contentType"/>
-    <ds:schemaRef ds:uri="http://schemas.microsoft.com/office/2006/metadata/properties/metaAttributes"/>
-    <ds:schemaRef ds:uri="http://www.w3.org/2001/XMLSchema"/>
-    <ds:schemaRef ds:uri="http://schemas.microsoft.com/office/2006/metadata/properties"/>
-    <ds:schemaRef ds:uri="http://schemas.openxmlformats.org/package/2006/metadata/core-properties"/>
-    <ds:schemaRef ds:uri="http://purl.org/dc/elements/1.1/"/>
-    <ds:schemaRef ds:uri="http://purl.org/dc/terms/"/>
-    <ds:schemaRef ds:uri="http://schemas.microsoft.com/office/internal/2005/internalDocumentation"/>
+    <ds:schemaRef ds:uri="http://schemas.microsoft.com/sharepoint/v3/contenttype/forms"/>
   </ds:schemaRefs>
 </ds:datastoreItem>
 </file>
@@ -7772,9 +8386,16 @@
 </file>
 
 <file path=customXml/itemProps3.xml><?xml version="1.0" encoding="utf-8"?>
-<ds:datastoreItem xmlns:ds="http://schemas.openxmlformats.org/officeDocument/2006/customXml" ds:itemID="{3B12FB4F-A943-493B-B875-6D5D04C611C6}">
+<ds:datastoreItem xmlns:ds="http://schemas.openxmlformats.org/officeDocument/2006/customXml" ds:itemID="{2EC21DD8-FAB6-4DD4-BCDC-FCBD54F1B193}">
   <ds:schemaRefs>
-    <ds:schemaRef ds:uri="http://schemas.microsoft.com/sharepoint/v3/contenttype/forms"/>
+    <ds:schemaRef ds:uri="http://schemas.microsoft.com/office/2006/metadata/contentType"/>
+    <ds:schemaRef ds:uri="http://schemas.microsoft.com/office/2006/metadata/properties/metaAttributes"/>
+    <ds:schemaRef ds:uri="http://www.w3.org/2001/XMLSchema"/>
+    <ds:schemaRef ds:uri="http://schemas.microsoft.com/office/2006/metadata/properties"/>
+    <ds:schemaRef ds:uri="http://schemas.openxmlformats.org/package/2006/metadata/core-properties"/>
+    <ds:schemaRef ds:uri="http://purl.org/dc/elements/1.1/"/>
+    <ds:schemaRef ds:uri="http://purl.org/dc/terms/"/>
+    <ds:schemaRef ds:uri="http://schemas.microsoft.com/office/internal/2005/internalDocumentation"/>
   </ds:schemaRefs>
 </ds:datastoreItem>
 </file>
</xml_diff>